<commit_message>
my part added-font changed-not completed
</commit_message>
<xml_diff>
--- a/DesignPatterns.pptx
+++ b/DesignPatterns.pptx
@@ -5,7 +5,7 @@
     <p:sldMasterId id="2147483660" r:id="rId1"/>
   </p:sldMasterIdLst>
   <p:notesMasterIdLst>
-    <p:notesMasterId r:id="rId29"/>
+    <p:notesMasterId r:id="rId35"/>
   </p:notesMasterIdLst>
   <p:sldIdLst>
     <p:sldId id="256" r:id="rId2"/>
@@ -35,22 +35,16 @@
     <p:sldId id="305" r:id="rId26"/>
     <p:sldId id="306" r:id="rId27"/>
     <p:sldId id="307" r:id="rId28"/>
+    <p:sldId id="309" r:id="rId29"/>
+    <p:sldId id="310" r:id="rId30"/>
+    <p:sldId id="311" r:id="rId31"/>
+    <p:sldId id="312" r:id="rId32"/>
+    <p:sldId id="313" r:id="rId33"/>
+    <p:sldId id="314" r:id="rId34"/>
   </p:sldIdLst>
   <p:sldSz cx="9144000" cy="5143500" type="screen16x9"/>
   <p:notesSz cx="6858000" cy="9144000"/>
   <p:embeddedFontLst>
-    <p:embeddedFont>
-      <p:font typeface="Montserrat ExtraBold" panose="020B0604020202020204" charset="0"/>
-      <p:bold r:id="rId30"/>
-      <p:boldItalic r:id="rId31"/>
-    </p:embeddedFont>
-    <p:embeddedFont>
-      <p:font typeface="Consolas" panose="020B0609020204030204" pitchFamily="49" charset="0"/>
-      <p:regular r:id="rId32"/>
-      <p:bold r:id="rId33"/>
-      <p:italic r:id="rId34"/>
-      <p:boldItalic r:id="rId35"/>
-    </p:embeddedFont>
     <p:embeddedFont>
       <p:font typeface="Montserrat" panose="020B0604020202020204" charset="0"/>
       <p:regular r:id="rId36"/>
@@ -64,6 +58,18 @@
       <p:bold r:id="rId41"/>
       <p:italic r:id="rId42"/>
       <p:boldItalic r:id="rId43"/>
+    </p:embeddedFont>
+    <p:embeddedFont>
+      <p:font typeface="Montserrat ExtraBold" panose="020B0604020202020204" charset="0"/>
+      <p:bold r:id="rId44"/>
+      <p:boldItalic r:id="rId45"/>
+    </p:embeddedFont>
+    <p:embeddedFont>
+      <p:font typeface="Consolas" panose="020B0609020204030204" pitchFamily="49" charset="0"/>
+      <p:regular r:id="rId46"/>
+      <p:bold r:id="rId47"/>
+      <p:italic r:id="rId48"/>
+      <p:boldItalic r:id="rId49"/>
     </p:embeddedFont>
   </p:embeddedFontLst>
   <p:defaultTextStyle>
@@ -295,6 +301,11 @@
       </a:defRPr>
     </a:lvl9pPr>
   </p:defaultTextStyle>
+  <p:extLst>
+    <p:ext uri="{EFAFB233-063F-42B5-8137-9DF3F51BA10A}">
+      <p15:sldGuideLst xmlns:p15="http://schemas.microsoft.com/office/powerpoint/2012/main"/>
+    </p:ext>
+  </p:extLst>
 </p:presentation>
 </file>
 
@@ -2964,6 +2975,224 @@
 </p:notes>
 </file>
 
+<file path=ppt/notesSlides/notesSlide28.xml><?xml version="1.0" encoding="utf-8"?>
+<p:notes xmlns:a="http://schemas.openxmlformats.org/drawingml/2006/main" xmlns:r="http://schemas.openxmlformats.org/officeDocument/2006/relationships" xmlns:p="http://schemas.openxmlformats.org/presentationml/2006/main" showMasterSp="0" showMasterPhAnim="0">
+  <p:cSld>
+    <p:spTree>
+      <p:nvGrpSpPr>
+        <p:cNvPr id="1" name="Shape 645"/>
+        <p:cNvGrpSpPr/>
+        <p:nvPr/>
+      </p:nvGrpSpPr>
+      <p:grpSpPr>
+        <a:xfrm>
+          <a:off x="0" y="0"/>
+          <a:ext cx="0" cy="0"/>
+          <a:chOff x="0" y="0"/>
+          <a:chExt cx="0" cy="0"/>
+        </a:xfrm>
+      </p:grpSpPr>
+      <p:sp>
+        <p:nvSpPr>
+          <p:cNvPr id="646" name="Google Shape;646;g35f391192_029:notes"/>
+          <p:cNvSpPr>
+            <a:spLocks noGrp="1" noRot="1" noChangeAspect="1"/>
+          </p:cNvSpPr>
+          <p:nvPr>
+            <p:ph type="sldImg" idx="2"/>
+          </p:nvPr>
+        </p:nvSpPr>
+        <p:spPr>
+          <a:xfrm>
+            <a:off x="381000" y="685800"/>
+            <a:ext cx="6096000" cy="3429000"/>
+          </a:xfrm>
+          <a:custGeom>
+            <a:avLst/>
+            <a:gdLst/>
+            <a:ahLst/>
+            <a:cxnLst/>
+            <a:rect l="l" t="t" r="r" b="b"/>
+            <a:pathLst>
+              <a:path w="120000" h="120000" extrusionOk="0">
+                <a:moveTo>
+                  <a:pt x="0" y="0"/>
+                </a:moveTo>
+                <a:lnTo>
+                  <a:pt x="120000" y="0"/>
+                </a:lnTo>
+                <a:lnTo>
+                  <a:pt x="120000" y="120000"/>
+                </a:lnTo>
+                <a:lnTo>
+                  <a:pt x="0" y="120000"/>
+                </a:lnTo>
+                <a:close/>
+              </a:path>
+            </a:pathLst>
+          </a:custGeom>
+        </p:spPr>
+      </p:sp>
+      <p:sp>
+        <p:nvSpPr>
+          <p:cNvPr id="647" name="Google Shape;647;g35f391192_029:notes"/>
+          <p:cNvSpPr txBox="1">
+            <a:spLocks noGrp="1"/>
+          </p:cNvSpPr>
+          <p:nvPr>
+            <p:ph type="body" idx="1"/>
+          </p:nvPr>
+        </p:nvSpPr>
+        <p:spPr>
+          <a:xfrm>
+            <a:off x="685800" y="4343400"/>
+            <a:ext cx="5486400" cy="4114800"/>
+          </a:xfrm>
+          <a:prstGeom prst="rect">
+            <a:avLst/>
+          </a:prstGeom>
+        </p:spPr>
+        <p:txBody>
+          <a:bodyPr spcFirstLastPara="1" wrap="square" lIns="91425" tIns="91425" rIns="91425" bIns="91425" anchor="t" anchorCtr="0">
+            <a:noAutofit/>
+          </a:bodyPr>
+          <a:lstStyle/>
+          <a:p>
+            <a:pPr marL="0" lvl="0" indent="0" algn="l" rtl="0">
+              <a:spcBef>
+                <a:spcPts val="0"/>
+              </a:spcBef>
+              <a:spcAft>
+                <a:spcPts val="0"/>
+              </a:spcAft>
+              <a:buNone/>
+            </a:pPr>
+            <a:endParaRPr/>
+          </a:p>
+        </p:txBody>
+      </p:sp>
+    </p:spTree>
+    <p:extLst>
+      <p:ext uri="{BB962C8B-B14F-4D97-AF65-F5344CB8AC3E}">
+        <p14:creationId xmlns:p14="http://schemas.microsoft.com/office/powerpoint/2010/main" val="896039878"/>
+      </p:ext>
+    </p:extLst>
+  </p:cSld>
+  <p:clrMapOvr>
+    <a:masterClrMapping/>
+  </p:clrMapOvr>
+</p:notes>
+</file>
+
+<file path=ppt/notesSlides/notesSlide29.xml><?xml version="1.0" encoding="utf-8"?>
+<p:notes xmlns:a="http://schemas.openxmlformats.org/drawingml/2006/main" xmlns:r="http://schemas.openxmlformats.org/officeDocument/2006/relationships" xmlns:p="http://schemas.openxmlformats.org/presentationml/2006/main" showMasterSp="0" showMasterPhAnim="0">
+  <p:cSld>
+    <p:spTree>
+      <p:nvGrpSpPr>
+        <p:cNvPr id="1" name="Shape 645"/>
+        <p:cNvGrpSpPr/>
+        <p:nvPr/>
+      </p:nvGrpSpPr>
+      <p:grpSpPr>
+        <a:xfrm>
+          <a:off x="0" y="0"/>
+          <a:ext cx="0" cy="0"/>
+          <a:chOff x="0" y="0"/>
+          <a:chExt cx="0" cy="0"/>
+        </a:xfrm>
+      </p:grpSpPr>
+      <p:sp>
+        <p:nvSpPr>
+          <p:cNvPr id="646" name="Google Shape;646;g35f391192_029:notes"/>
+          <p:cNvSpPr>
+            <a:spLocks noGrp="1" noRot="1" noChangeAspect="1"/>
+          </p:cNvSpPr>
+          <p:nvPr>
+            <p:ph type="sldImg" idx="2"/>
+          </p:nvPr>
+        </p:nvSpPr>
+        <p:spPr>
+          <a:xfrm>
+            <a:off x="381000" y="685800"/>
+            <a:ext cx="6096000" cy="3429000"/>
+          </a:xfrm>
+          <a:custGeom>
+            <a:avLst/>
+            <a:gdLst/>
+            <a:ahLst/>
+            <a:cxnLst/>
+            <a:rect l="l" t="t" r="r" b="b"/>
+            <a:pathLst>
+              <a:path w="120000" h="120000" extrusionOk="0">
+                <a:moveTo>
+                  <a:pt x="0" y="0"/>
+                </a:moveTo>
+                <a:lnTo>
+                  <a:pt x="120000" y="0"/>
+                </a:lnTo>
+                <a:lnTo>
+                  <a:pt x="120000" y="120000"/>
+                </a:lnTo>
+                <a:lnTo>
+                  <a:pt x="0" y="120000"/>
+                </a:lnTo>
+                <a:close/>
+              </a:path>
+            </a:pathLst>
+          </a:custGeom>
+        </p:spPr>
+      </p:sp>
+      <p:sp>
+        <p:nvSpPr>
+          <p:cNvPr id="647" name="Google Shape;647;g35f391192_029:notes"/>
+          <p:cNvSpPr txBox="1">
+            <a:spLocks noGrp="1"/>
+          </p:cNvSpPr>
+          <p:nvPr>
+            <p:ph type="body" idx="1"/>
+          </p:nvPr>
+        </p:nvSpPr>
+        <p:spPr>
+          <a:xfrm>
+            <a:off x="685800" y="4343400"/>
+            <a:ext cx="5486400" cy="4114800"/>
+          </a:xfrm>
+          <a:prstGeom prst="rect">
+            <a:avLst/>
+          </a:prstGeom>
+        </p:spPr>
+        <p:txBody>
+          <a:bodyPr spcFirstLastPara="1" wrap="square" lIns="91425" tIns="91425" rIns="91425" bIns="91425" anchor="t" anchorCtr="0">
+            <a:noAutofit/>
+          </a:bodyPr>
+          <a:lstStyle/>
+          <a:p>
+            <a:pPr marL="0" lvl="0" indent="0" algn="l" rtl="0">
+              <a:spcBef>
+                <a:spcPts val="0"/>
+              </a:spcBef>
+              <a:spcAft>
+                <a:spcPts val="0"/>
+              </a:spcAft>
+              <a:buNone/>
+            </a:pPr>
+            <a:endParaRPr/>
+          </a:p>
+        </p:txBody>
+      </p:sp>
+    </p:spTree>
+    <p:extLst>
+      <p:ext uri="{BB962C8B-B14F-4D97-AF65-F5344CB8AC3E}">
+        <p14:creationId xmlns:p14="http://schemas.microsoft.com/office/powerpoint/2010/main" val="793425454"/>
+      </p:ext>
+    </p:extLst>
+  </p:cSld>
+  <p:clrMapOvr>
+    <a:masterClrMapping/>
+  </p:clrMapOvr>
+</p:notes>
+</file>
+
 <file path=ppt/notesSlides/notesSlide3.xml><?xml version="1.0" encoding="utf-8"?>
 <p:notes xmlns:a="http://schemas.openxmlformats.org/drawingml/2006/main" xmlns:r="http://schemas.openxmlformats.org/officeDocument/2006/relationships" xmlns:p="http://schemas.openxmlformats.org/presentationml/2006/main" showMasterSp="0" showMasterPhAnim="0">
   <p:cSld>
@@ -3203,6 +3432,115 @@
         </p:txBody>
       </p:sp>
     </p:spTree>
+  </p:cSld>
+  <p:clrMapOvr>
+    <a:masterClrMapping/>
+  </p:clrMapOvr>
+</p:notes>
+</file>
+
+<file path=ppt/notesSlides/notesSlide30.xml><?xml version="1.0" encoding="utf-8"?>
+<p:notes xmlns:a="http://schemas.openxmlformats.org/drawingml/2006/main" xmlns:r="http://schemas.openxmlformats.org/officeDocument/2006/relationships" xmlns:p="http://schemas.openxmlformats.org/presentationml/2006/main" showMasterSp="0" showMasterPhAnim="0">
+  <p:cSld>
+    <p:spTree>
+      <p:nvGrpSpPr>
+        <p:cNvPr id="1" name="Shape 645"/>
+        <p:cNvGrpSpPr/>
+        <p:nvPr/>
+      </p:nvGrpSpPr>
+      <p:grpSpPr>
+        <a:xfrm>
+          <a:off x="0" y="0"/>
+          <a:ext cx="0" cy="0"/>
+          <a:chOff x="0" y="0"/>
+          <a:chExt cx="0" cy="0"/>
+        </a:xfrm>
+      </p:grpSpPr>
+      <p:sp>
+        <p:nvSpPr>
+          <p:cNvPr id="646" name="Google Shape;646;g35f391192_029:notes"/>
+          <p:cNvSpPr>
+            <a:spLocks noGrp="1" noRot="1" noChangeAspect="1"/>
+          </p:cNvSpPr>
+          <p:nvPr>
+            <p:ph type="sldImg" idx="2"/>
+          </p:nvPr>
+        </p:nvSpPr>
+        <p:spPr>
+          <a:xfrm>
+            <a:off x="381000" y="685800"/>
+            <a:ext cx="6096000" cy="3429000"/>
+          </a:xfrm>
+          <a:custGeom>
+            <a:avLst/>
+            <a:gdLst/>
+            <a:ahLst/>
+            <a:cxnLst/>
+            <a:rect l="l" t="t" r="r" b="b"/>
+            <a:pathLst>
+              <a:path w="120000" h="120000" extrusionOk="0">
+                <a:moveTo>
+                  <a:pt x="0" y="0"/>
+                </a:moveTo>
+                <a:lnTo>
+                  <a:pt x="120000" y="0"/>
+                </a:lnTo>
+                <a:lnTo>
+                  <a:pt x="120000" y="120000"/>
+                </a:lnTo>
+                <a:lnTo>
+                  <a:pt x="0" y="120000"/>
+                </a:lnTo>
+                <a:close/>
+              </a:path>
+            </a:pathLst>
+          </a:custGeom>
+        </p:spPr>
+      </p:sp>
+      <p:sp>
+        <p:nvSpPr>
+          <p:cNvPr id="647" name="Google Shape;647;g35f391192_029:notes"/>
+          <p:cNvSpPr txBox="1">
+            <a:spLocks noGrp="1"/>
+          </p:cNvSpPr>
+          <p:nvPr>
+            <p:ph type="body" idx="1"/>
+          </p:nvPr>
+        </p:nvSpPr>
+        <p:spPr>
+          <a:xfrm>
+            <a:off x="685800" y="4343400"/>
+            <a:ext cx="5486400" cy="4114800"/>
+          </a:xfrm>
+          <a:prstGeom prst="rect">
+            <a:avLst/>
+          </a:prstGeom>
+        </p:spPr>
+        <p:txBody>
+          <a:bodyPr spcFirstLastPara="1" wrap="square" lIns="91425" tIns="91425" rIns="91425" bIns="91425" anchor="t" anchorCtr="0">
+            <a:noAutofit/>
+          </a:bodyPr>
+          <a:lstStyle/>
+          <a:p>
+            <a:pPr marL="0" lvl="0" indent="0" algn="l" rtl="0">
+              <a:spcBef>
+                <a:spcPts val="0"/>
+              </a:spcBef>
+              <a:spcAft>
+                <a:spcPts val="0"/>
+              </a:spcAft>
+              <a:buNone/>
+            </a:pPr>
+            <a:endParaRPr/>
+          </a:p>
+        </p:txBody>
+      </p:sp>
+    </p:spTree>
+    <p:extLst>
+      <p:ext uri="{BB962C8B-B14F-4D97-AF65-F5344CB8AC3E}">
+        <p14:creationId xmlns:p14="http://schemas.microsoft.com/office/powerpoint/2010/main" val="3040746183"/>
+      </p:ext>
+    </p:extLst>
   </p:cSld>
   <p:clrMapOvr>
     <a:masterClrMapping/>
@@ -26042,13 +26380,13 @@
   <p:clrMapOvr>
     <a:masterClrMapping/>
   </p:clrMapOvr>
-  <mc:AlternateContent xmlns:mc="http://schemas.openxmlformats.org/markup-compatibility/2006">
-    <mc:Choice xmlns:p14="http://schemas.microsoft.com/office/powerpoint/2010/main" Requires="p14">
+  <mc:AlternateContent xmlns:mc="http://schemas.openxmlformats.org/markup-compatibility/2006" xmlns:p14="http://schemas.microsoft.com/office/powerpoint/2010/main">
+    <mc:Choice Requires="p14">
       <p:transition spd="slow" p14:dur="3400">
         <p14:reveal/>
       </p:transition>
     </mc:Choice>
-    <mc:Fallback>
+    <mc:Fallback xmlns="">
       <p:transition spd="slow">
         <p:fade/>
       </p:transition>
@@ -26681,7 +27019,7 @@
                 <a:solidFill>
                   <a:srgbClr val="FFC800"/>
                 </a:solidFill>
-                <a:latin typeface="Adobe Heiti Std R" panose="020B0400000000000000" pitchFamily="34" charset="-128"/>
+                <a:latin typeface="+mn-lt"/>
                 <a:ea typeface="Adobe Heiti Std R" panose="020B0400000000000000" pitchFamily="34" charset="-128"/>
               </a:rPr>
               <a:t>Creational</a:t>
@@ -26690,7 +27028,7 @@
               <a:solidFill>
                 <a:srgbClr val="FFC800"/>
               </a:solidFill>
-              <a:latin typeface="Adobe Heiti Std R" panose="020B0400000000000000" pitchFamily="34" charset="-128"/>
+              <a:latin typeface="+mn-lt"/>
               <a:ea typeface="Adobe Heiti Std R" panose="020B0400000000000000" pitchFamily="34" charset="-128"/>
             </a:endParaRPr>
           </a:p>
@@ -26736,13 +27074,13 @@
   <p:clrMapOvr>
     <a:masterClrMapping/>
   </p:clrMapOvr>
-  <mc:AlternateContent xmlns:mc="http://schemas.openxmlformats.org/markup-compatibility/2006">
-    <mc:Choice xmlns:p14="http://schemas.microsoft.com/office/powerpoint/2010/main" Requires="p14">
+  <mc:AlternateContent xmlns:mc="http://schemas.openxmlformats.org/markup-compatibility/2006" xmlns:p14="http://schemas.microsoft.com/office/powerpoint/2010/main">
+    <mc:Choice Requires="p14">
       <p:transition spd="slow" p14:dur="1600">
         <p:blinds dir="vert"/>
       </p:transition>
     </mc:Choice>
-    <mc:Fallback>
+    <mc:Fallback xmlns="">
       <p:transition spd="slow">
         <p:blinds dir="vert"/>
       </p:transition>
@@ -27119,7 +27457,7 @@
                 <a:solidFill>
                   <a:srgbClr val="FFC800"/>
                 </a:solidFill>
-                <a:latin typeface="Adobe Heiti Std R" panose="020B0400000000000000" pitchFamily="34" charset="-128"/>
+                <a:latin typeface="+mn-lt"/>
                 <a:ea typeface="Adobe Heiti Std R" panose="020B0400000000000000" pitchFamily="34" charset="-128"/>
               </a:rPr>
               <a:t>Creational</a:t>
@@ -27128,7 +27466,7 @@
               <a:solidFill>
                 <a:srgbClr val="FFC800"/>
               </a:solidFill>
-              <a:latin typeface="Adobe Heiti Std R" panose="020B0400000000000000" pitchFamily="34" charset="-128"/>
+              <a:latin typeface="+mn-lt"/>
               <a:ea typeface="Adobe Heiti Std R" panose="020B0400000000000000" pitchFamily="34" charset="-128"/>
             </a:endParaRPr>
           </a:p>
@@ -27398,7 +27736,7 @@
         <p:spPr>
           <a:xfrm>
             <a:off x="278175" y="652272"/>
-            <a:ext cx="1072730" cy="307777"/>
+            <a:ext cx="1031051" cy="307777"/>
           </a:xfrm>
           <a:prstGeom prst="rect">
             <a:avLst/>
@@ -27418,7 +27756,7 @@
                 <a:solidFill>
                   <a:srgbClr val="FFC800"/>
                 </a:solidFill>
-                <a:latin typeface="Adobe Heiti Std R" panose="020B0400000000000000" pitchFamily="34" charset="-128"/>
+                <a:latin typeface="+mn-lt"/>
                 <a:ea typeface="Adobe Heiti Std R" panose="020B0400000000000000" pitchFamily="34" charset="-128"/>
               </a:rPr>
               <a:t>Structural</a:t>
@@ -27427,7 +27765,7 @@
               <a:solidFill>
                 <a:srgbClr val="FFC800"/>
               </a:solidFill>
-              <a:latin typeface="Adobe Heiti Std R" panose="020B0400000000000000" pitchFamily="34" charset="-128"/>
+              <a:latin typeface="+mn-lt"/>
               <a:ea typeface="Adobe Heiti Std R" panose="020B0400000000000000" pitchFamily="34" charset="-128"/>
             </a:endParaRPr>
           </a:p>
@@ -27473,13 +27811,13 @@
   <p:clrMapOvr>
     <a:masterClrMapping/>
   </p:clrMapOvr>
-  <mc:AlternateContent xmlns:mc="http://schemas.openxmlformats.org/markup-compatibility/2006">
-    <mc:Choice xmlns:p15="http://schemas.microsoft.com/office/powerpoint/2012/main" Requires="p15">
+  <mc:AlternateContent xmlns:mc="http://schemas.openxmlformats.org/markup-compatibility/2006" xmlns:p15="http://schemas.microsoft.com/office/powerpoint/2012/main">
+    <mc:Choice Requires="p15">
       <p:transition xmlns:p14="http://schemas.microsoft.com/office/powerpoint/2010/main" spd="slow" p14:dur="1250">
         <p15:prstTrans prst="peelOff"/>
       </p:transition>
     </mc:Choice>
-    <mc:Fallback>
+    <mc:Fallback xmlns="">
       <p:transition spd="slow">
         <p:fade/>
       </p:transition>
@@ -27882,7 +28220,7 @@
         <p:spPr>
           <a:xfrm>
             <a:off x="278175" y="652272"/>
-            <a:ext cx="1072730" cy="307777"/>
+            <a:ext cx="1031051" cy="307777"/>
           </a:xfrm>
           <a:prstGeom prst="rect">
             <a:avLst/>
@@ -27902,7 +28240,7 @@
                 <a:solidFill>
                   <a:srgbClr val="FFC800"/>
                 </a:solidFill>
-                <a:latin typeface="Adobe Heiti Std R" panose="020B0400000000000000" pitchFamily="34" charset="-128"/>
+                <a:latin typeface="+mn-lt"/>
                 <a:ea typeface="Adobe Heiti Std R" panose="020B0400000000000000" pitchFamily="34" charset="-128"/>
               </a:rPr>
               <a:t>Structural</a:t>
@@ -27911,7 +28249,7 @@
               <a:solidFill>
                 <a:srgbClr val="FFC800"/>
               </a:solidFill>
-              <a:latin typeface="Adobe Heiti Std R" panose="020B0400000000000000" pitchFamily="34" charset="-128"/>
+              <a:latin typeface="+mn-lt"/>
               <a:ea typeface="Adobe Heiti Std R" panose="020B0400000000000000" pitchFamily="34" charset="-128"/>
             </a:endParaRPr>
           </a:p>
@@ -28105,7 +28443,7 @@
         <p:spPr>
           <a:xfrm>
             <a:off x="278175" y="652272"/>
-            <a:ext cx="1072730" cy="307777"/>
+            <a:ext cx="1031051" cy="307777"/>
           </a:xfrm>
           <a:prstGeom prst="rect">
             <a:avLst/>
@@ -28125,7 +28463,7 @@
                 <a:solidFill>
                   <a:srgbClr val="FFC800"/>
                 </a:solidFill>
-                <a:latin typeface="Adobe Heiti Std R" panose="020B0400000000000000" pitchFamily="34" charset="-128"/>
+                <a:latin typeface="+mn-lt"/>
                 <a:ea typeface="Adobe Heiti Std R" panose="020B0400000000000000" pitchFamily="34" charset="-128"/>
               </a:rPr>
               <a:t>Structural</a:t>
@@ -28134,7 +28472,7 @@
               <a:solidFill>
                 <a:srgbClr val="FFC800"/>
               </a:solidFill>
-              <a:latin typeface="Adobe Heiti Std R" panose="020B0400000000000000" pitchFamily="34" charset="-128"/>
+              <a:latin typeface="+mn-lt"/>
               <a:ea typeface="Adobe Heiti Std R" panose="020B0400000000000000" pitchFamily="34" charset="-128"/>
             </a:endParaRPr>
           </a:p>
@@ -28400,7 +28738,7 @@
                 <a:solidFill>
                   <a:srgbClr val="FFC800"/>
                 </a:solidFill>
-                <a:latin typeface="Adobe Heiti Std R" panose="020B0400000000000000" pitchFamily="34" charset="-128"/>
+                <a:latin typeface="+mn-lt"/>
                 <a:ea typeface="Adobe Heiti Std R" panose="020B0400000000000000" pitchFamily="34" charset="-128"/>
               </a:rPr>
               <a:t>Behavioral</a:t>
@@ -28409,7 +28747,7 @@
               <a:solidFill>
                 <a:srgbClr val="FFC800"/>
               </a:solidFill>
-              <a:latin typeface="Adobe Heiti Std R" panose="020B0400000000000000" pitchFamily="34" charset="-128"/>
+              <a:latin typeface="+mn-lt"/>
               <a:ea typeface="Adobe Heiti Std R" panose="020B0400000000000000" pitchFamily="34" charset="-128"/>
             </a:endParaRPr>
           </a:p>
@@ -28425,13 +28763,13 @@
   <p:clrMapOvr>
     <a:masterClrMapping/>
   </p:clrMapOvr>
-  <mc:AlternateContent xmlns:mc="http://schemas.openxmlformats.org/markup-compatibility/2006">
-    <mc:Choice xmlns:p15="http://schemas.microsoft.com/office/powerpoint/2012/main" Requires="p15">
+  <mc:AlternateContent xmlns:mc="http://schemas.openxmlformats.org/markup-compatibility/2006" xmlns:p15="http://schemas.microsoft.com/office/powerpoint/2012/main">
+    <mc:Choice Requires="p15">
       <p:transition xmlns:p14="http://schemas.microsoft.com/office/powerpoint/2010/main" spd="slow" p14:dur="1250">
         <p15:prstTrans prst="peelOff"/>
       </p:transition>
     </mc:Choice>
-    <mc:Fallback>
+    <mc:Fallback xmlns="">
       <p:transition spd="slow">
         <p:fade/>
       </p:transition>
@@ -28711,7 +29049,7 @@
                 <a:solidFill>
                   <a:srgbClr val="FFC800"/>
                 </a:solidFill>
-                <a:latin typeface="Adobe Heiti Std R" panose="020B0400000000000000" pitchFamily="34" charset="-128"/>
+                <a:latin typeface="+mn-lt"/>
                 <a:ea typeface="Adobe Heiti Std R" panose="020B0400000000000000" pitchFamily="34" charset="-128"/>
               </a:rPr>
               <a:t>Behavioral</a:t>
@@ -28720,7 +29058,7 @@
               <a:solidFill>
                 <a:srgbClr val="FFC800"/>
               </a:solidFill>
-              <a:latin typeface="Adobe Heiti Std R" panose="020B0400000000000000" pitchFamily="34" charset="-128"/>
+              <a:latin typeface="+mn-lt"/>
               <a:ea typeface="Adobe Heiti Std R" panose="020B0400000000000000" pitchFamily="34" charset="-128"/>
             </a:endParaRPr>
           </a:p>
@@ -28998,7 +29336,7 @@
                 <a:solidFill>
                   <a:srgbClr val="FFC800"/>
                 </a:solidFill>
-                <a:latin typeface="Adobe Heiti Std R" panose="020B0400000000000000" pitchFamily="34" charset="-128"/>
+                <a:latin typeface="+mn-lt"/>
                 <a:ea typeface="Adobe Heiti Std R" panose="020B0400000000000000" pitchFamily="34" charset="-128"/>
               </a:rPr>
               <a:t>Behavioral</a:t>
@@ -29007,7 +29345,7 @@
               <a:solidFill>
                 <a:srgbClr val="FFC800"/>
               </a:solidFill>
-              <a:latin typeface="Adobe Heiti Std R" panose="020B0400000000000000" pitchFamily="34" charset="-128"/>
+              <a:latin typeface="+mn-lt"/>
               <a:ea typeface="Adobe Heiti Std R" panose="020B0400000000000000" pitchFamily="34" charset="-128"/>
             </a:endParaRPr>
           </a:p>
@@ -29554,7 +29892,7 @@
                 <a:solidFill>
                   <a:srgbClr val="FFC800"/>
                 </a:solidFill>
-                <a:latin typeface="Adobe Heiti Std R" panose="020B0400000000000000" pitchFamily="34" charset="-128"/>
+                <a:latin typeface="+mn-lt"/>
                 <a:ea typeface="Adobe Heiti Std R" panose="020B0400000000000000" pitchFamily="34" charset="-128"/>
               </a:rPr>
               <a:t>Behavioral</a:t>
@@ -29563,7 +29901,7 @@
               <a:solidFill>
                 <a:srgbClr val="FFC800"/>
               </a:solidFill>
-              <a:latin typeface="Adobe Heiti Std R" panose="020B0400000000000000" pitchFamily="34" charset="-128"/>
+              <a:latin typeface="+mn-lt"/>
               <a:ea typeface="Adobe Heiti Std R" panose="020B0400000000000000" pitchFamily="34" charset="-128"/>
             </a:endParaRPr>
           </a:p>
@@ -31491,13 +31829,13 @@
   <p:clrMapOvr>
     <a:masterClrMapping/>
   </p:clrMapOvr>
-  <mc:AlternateContent xmlns:mc="http://schemas.openxmlformats.org/markup-compatibility/2006">
-    <mc:Choice xmlns:p15="http://schemas.microsoft.com/office/powerpoint/2012/main" Requires="p15">
+  <mc:AlternateContent xmlns:mc="http://schemas.openxmlformats.org/markup-compatibility/2006" xmlns:p15="http://schemas.microsoft.com/office/powerpoint/2012/main">
+    <mc:Choice Requires="p15">
       <p:transition xmlns:p14="http://schemas.microsoft.com/office/powerpoint/2010/main" spd="slow" p14:dur="2000">
         <p15:prstTrans prst="prestige"/>
       </p:transition>
     </mc:Choice>
-    <mc:Fallback>
+    <mc:Fallback xmlns="">
       <p:transition spd="slow">
         <p:fade/>
       </p:transition>
@@ -32020,11 +32358,7 @@
             </a:pPr>
             <a:r>
               <a:rPr lang="en-US" sz="1200" dirty="0" smtClean="0"/>
-              <a:t>- </a:t>
-            </a:r>
-            <a:r>
-              <a:rPr lang="en-US" sz="1200" dirty="0" smtClean="0"/>
-              <a:t>Oxford Online Dictionary</a:t>
+              <a:t>- Oxford Online Dictionary</a:t>
             </a:r>
             <a:endParaRPr sz="1200" dirty="0"/>
           </a:p>
@@ -33022,7 +33356,6 @@
               <a:rPr lang="en-US" sz="1600" dirty="0" smtClean="0"/>
               <a:t>(1)</a:t>
             </a:r>
-            <a:endParaRPr lang="en-US" sz="1600" dirty="0" smtClean="0"/>
           </a:p>
         </p:txBody>
       </p:sp>
@@ -33639,7 +33972,6 @@
               <a:rPr lang="en-US" sz="1600" dirty="0" smtClean="0"/>
               <a:t>(2)</a:t>
             </a:r>
-            <a:endParaRPr lang="en-US" sz="1600" dirty="0" smtClean="0"/>
           </a:p>
         </p:txBody>
       </p:sp>
@@ -33926,7 +34258,6 @@
               <a:rPr lang="en-US" sz="1600" dirty="0" smtClean="0"/>
               <a:t>(3)</a:t>
             </a:r>
-            <a:endParaRPr lang="en-US" sz="1600" dirty="0" smtClean="0"/>
           </a:p>
         </p:txBody>
       </p:sp>
@@ -33940,13 +34271,13 @@
   <p:clrMapOvr>
     <a:masterClrMapping/>
   </p:clrMapOvr>
-  <mc:AlternateContent xmlns:mc="http://schemas.openxmlformats.org/markup-compatibility/2006">
-    <mc:Choice xmlns:p15="http://schemas.microsoft.com/office/powerpoint/2012/main" Requires="p15">
+  <mc:AlternateContent xmlns:mc="http://schemas.openxmlformats.org/markup-compatibility/2006" xmlns:p15="http://schemas.microsoft.com/office/powerpoint/2012/main">
+    <mc:Choice Requires="p15">
       <p:transition xmlns:p14="http://schemas.microsoft.com/office/powerpoint/2010/main" spd="slow" p14:dur="2000">
         <p15:prstTrans prst="drape"/>
       </p:transition>
     </mc:Choice>
-    <mc:Fallback>
+    <mc:Fallback xmlns="">
       <p:transition spd="slow">
         <p:fade/>
       </p:transition>
@@ -35353,13 +35684,13 @@
   <p:clrMapOvr>
     <a:masterClrMapping/>
   </p:clrMapOvr>
-  <mc:AlternateContent xmlns:mc="http://schemas.openxmlformats.org/markup-compatibility/2006">
-    <mc:Choice xmlns:p15="http://schemas.microsoft.com/office/powerpoint/2012/main" Requires="p15">
+  <mc:AlternateContent xmlns:mc="http://schemas.openxmlformats.org/markup-compatibility/2006" xmlns:p15="http://schemas.microsoft.com/office/powerpoint/2012/main">
+    <mc:Choice Requires="p15">
       <p:transition xmlns:p14="http://schemas.microsoft.com/office/powerpoint/2010/main" spd="slow" p14:dur="2000">
         <p15:prstTrans prst="drape"/>
       </p:transition>
     </mc:Choice>
-    <mc:Fallback>
+    <mc:Fallback xmlns="">
       <p:transition spd="slow">
         <p:fade/>
       </p:transition>
@@ -36273,7 +36604,7 @@
         <p:spPr>
           <a:xfrm>
             <a:off x="278175" y="652272"/>
-            <a:ext cx="1011815" cy="307777"/>
+            <a:ext cx="970137" cy="307777"/>
           </a:xfrm>
           <a:prstGeom prst="rect">
             <a:avLst/>
@@ -36293,7 +36624,7 @@
                 <a:solidFill>
                   <a:srgbClr val="FFC800"/>
                 </a:solidFill>
-                <a:latin typeface="Adobe Heiti Std R" panose="020B0400000000000000" pitchFamily="34" charset="-128"/>
+                <a:latin typeface="+mn-lt"/>
                 <a:ea typeface="Adobe Heiti Std R" panose="020B0400000000000000" pitchFamily="34" charset="-128"/>
               </a:rPr>
               <a:t>Memento</a:t>
@@ -36302,7 +36633,7 @@
               <a:solidFill>
                 <a:srgbClr val="FFC800"/>
               </a:solidFill>
-              <a:latin typeface="Adobe Heiti Std R" panose="020B0400000000000000" pitchFamily="34" charset="-128"/>
+              <a:latin typeface="+mn-lt"/>
               <a:ea typeface="Adobe Heiti Std R" panose="020B0400000000000000" pitchFamily="34" charset="-128"/>
             </a:endParaRPr>
           </a:p>
@@ -36318,13 +36649,13 @@
   <p:clrMapOvr>
     <a:masterClrMapping/>
   </p:clrMapOvr>
-  <mc:AlternateContent xmlns:mc="http://schemas.openxmlformats.org/markup-compatibility/2006">
-    <mc:Choice xmlns:p14="http://schemas.microsoft.com/office/powerpoint/2010/main" Requires="p14">
+  <mc:AlternateContent xmlns:mc="http://schemas.openxmlformats.org/markup-compatibility/2006" xmlns:p14="http://schemas.microsoft.com/office/powerpoint/2010/main">
+    <mc:Choice Requires="p14">
       <p:transition spd="slow" p14:dur="1400">
         <p14:doors dir="vert"/>
       </p:transition>
     </mc:Choice>
-    <mc:Fallback>
+    <mc:Fallback xmlns="">
       <p:transition spd="slow">
         <p:fade/>
       </p:transition>
@@ -36686,10 +37017,20 @@
                 <a:solidFill>
                   <a:srgbClr val="FFC800"/>
                 </a:solidFill>
+                <a:latin typeface="+mn-lt"/>
+                <a:ea typeface="Adobe Heiti Std R" panose="020B0400000000000000" pitchFamily="34" charset="-128"/>
+              </a:rPr>
+              <a:t>Originator</a:t>
+            </a:r>
+            <a:r>
+              <a:rPr lang="en-US" b="1" dirty="0">
+                <a:solidFill>
+                  <a:srgbClr val="FFC800"/>
+                </a:solidFill>
                 <a:latin typeface="Adobe Heiti Std R" panose="020B0400000000000000" pitchFamily="34" charset="-128"/>
                 <a:ea typeface="Adobe Heiti Std R" panose="020B0400000000000000" pitchFamily="34" charset="-128"/>
               </a:rPr>
-              <a:t>Originator </a:t>
+              <a:t> </a:t>
             </a:r>
             <a:endParaRPr lang="fa-IR" dirty="0">
               <a:solidFill>
@@ -36711,13 +37052,13 @@
   <p:clrMapOvr>
     <a:masterClrMapping/>
   </p:clrMapOvr>
-  <mc:AlternateContent xmlns:mc="http://schemas.openxmlformats.org/markup-compatibility/2006">
-    <mc:Choice xmlns:p15="http://schemas.microsoft.com/office/powerpoint/2012/main" Requires="p15">
+  <mc:AlternateContent xmlns:mc="http://schemas.openxmlformats.org/markup-compatibility/2006" xmlns:p15="http://schemas.microsoft.com/office/powerpoint/2012/main">
+    <mc:Choice Requires="p15">
       <p:transition xmlns:p14="http://schemas.microsoft.com/office/powerpoint/2010/main" spd="slow" p14:dur="1250">
         <p15:prstTrans prst="pageCurlDouble"/>
       </p:transition>
     </mc:Choice>
-    <mc:Fallback>
+    <mc:Fallback xmlns="">
       <p:transition spd="slow">
         <p:fade/>
       </p:transition>
@@ -37077,7 +37418,7 @@
                 <a:solidFill>
                   <a:srgbClr val="FFC800"/>
                 </a:solidFill>
-                <a:latin typeface="Adobe Heiti Std R" panose="020B0400000000000000" pitchFamily="34" charset="-128"/>
+                <a:latin typeface="+mn-lt"/>
                 <a:ea typeface="Adobe Heiti Std R" panose="020B0400000000000000" pitchFamily="34" charset="-128"/>
               </a:rPr>
               <a:t>Originator</a:t>
@@ -37086,7 +37427,7 @@
               <a:solidFill>
                 <a:srgbClr val="FFC800"/>
               </a:solidFill>
-              <a:latin typeface="Adobe Heiti Std R" panose="020B0400000000000000" pitchFamily="34" charset="-128"/>
+              <a:latin typeface="+mn-lt"/>
               <a:ea typeface="Adobe Heiti Std R" panose="020B0400000000000000" pitchFamily="34" charset="-128"/>
             </a:endParaRPr>
           </a:p>
@@ -37102,13 +37443,13 @@
   <p:clrMapOvr>
     <a:masterClrMapping/>
   </p:clrMapOvr>
-  <mc:AlternateContent xmlns:mc="http://schemas.openxmlformats.org/markup-compatibility/2006">
-    <mc:Choice xmlns:p15="http://schemas.microsoft.com/office/powerpoint/2012/main" Requires="p15">
+  <mc:AlternateContent xmlns:mc="http://schemas.openxmlformats.org/markup-compatibility/2006" xmlns:p15="http://schemas.microsoft.com/office/powerpoint/2012/main">
+    <mc:Choice Requires="p15">
       <p:transition xmlns:p14="http://schemas.microsoft.com/office/powerpoint/2010/main" spd="slow" p14:dur="1250">
         <p15:prstTrans prst="pageCurlDouble"/>
       </p:transition>
     </mc:Choice>
-    <mc:Fallback>
+    <mc:Fallback xmlns="">
       <p:transition spd="slow">
         <p:fade/>
       </p:transition>
@@ -37518,7 +37859,7 @@
         <p:spPr>
           <a:xfrm>
             <a:off x="278175" y="652272"/>
-            <a:ext cx="1048685" cy="307777"/>
+            <a:ext cx="1061509" cy="307777"/>
           </a:xfrm>
           <a:prstGeom prst="rect">
             <a:avLst/>
@@ -37538,7 +37879,7 @@
                 <a:solidFill>
                   <a:srgbClr val="FFC800"/>
                 </a:solidFill>
-                <a:latin typeface="Adobe Heiti Std R" panose="020B0400000000000000" pitchFamily="34" charset="-128"/>
+                <a:latin typeface="+mn-lt"/>
                 <a:ea typeface="Adobe Heiti Std R" panose="020B0400000000000000" pitchFamily="34" charset="-128"/>
               </a:rPr>
               <a:t>CareTaker</a:t>
@@ -37547,7 +37888,7 @@
               <a:solidFill>
                 <a:srgbClr val="FFC800"/>
               </a:solidFill>
-              <a:latin typeface="Adobe Heiti Std R" panose="020B0400000000000000" pitchFamily="34" charset="-128"/>
+              <a:latin typeface="+mn-lt"/>
               <a:ea typeface="Adobe Heiti Std R" panose="020B0400000000000000" pitchFamily="34" charset="-128"/>
             </a:endParaRPr>
           </a:p>
@@ -37563,13 +37904,13 @@
   <p:clrMapOvr>
     <a:masterClrMapping/>
   </p:clrMapOvr>
-  <mc:AlternateContent xmlns:mc="http://schemas.openxmlformats.org/markup-compatibility/2006">
-    <mc:Choice xmlns:p15="http://schemas.microsoft.com/office/powerpoint/2012/main" Requires="p15">
+  <mc:AlternateContent xmlns:mc="http://schemas.openxmlformats.org/markup-compatibility/2006" xmlns:p15="http://schemas.microsoft.com/office/powerpoint/2012/main">
+    <mc:Choice Requires="p15">
       <p:transition xmlns:p14="http://schemas.microsoft.com/office/powerpoint/2010/main" spd="slow" p14:dur="1250">
         <p15:prstTrans prst="pageCurlDouble"/>
       </p:transition>
     </mc:Choice>
-    <mc:Fallback>
+    <mc:Fallback xmlns="">
       <p:transition spd="slow">
         <p:fade/>
       </p:transition>
@@ -37579,6 +37920,941 @@
     <p:tnLst>
       <p:par>
         <p:cTn id="1" dur="indefinite" restart="never" nodeType="tmRoot"/>
+      </p:par>
+    </p:tnLst>
+  </p:timing>
+</p:sld>
+</file>
+
+<file path=ppt/slides/slide28.xml><?xml version="1.0" encoding="utf-8"?>
+<p:sld xmlns:a="http://schemas.openxmlformats.org/drawingml/2006/main" xmlns:r="http://schemas.openxmlformats.org/officeDocument/2006/relationships" xmlns:p="http://schemas.openxmlformats.org/presentationml/2006/main">
+  <p:cSld>
+    <p:spTree>
+      <p:nvGrpSpPr>
+        <p:cNvPr id="1" name="Shape 648"/>
+        <p:cNvGrpSpPr/>
+        <p:nvPr/>
+      </p:nvGrpSpPr>
+      <p:grpSpPr>
+        <a:xfrm>
+          <a:off x="0" y="0"/>
+          <a:ext cx="0" cy="0"/>
+          <a:chOff x="0" y="0"/>
+          <a:chExt cx="0" cy="0"/>
+        </a:xfrm>
+      </p:grpSpPr>
+      <p:sp>
+        <p:nvSpPr>
+          <p:cNvPr id="649" name="Google Shape;649;p17"/>
+          <p:cNvSpPr txBox="1">
+            <a:spLocks noGrp="1"/>
+          </p:cNvSpPr>
+          <p:nvPr>
+            <p:ph type="ctrTitle"/>
+          </p:nvPr>
+        </p:nvSpPr>
+        <p:spPr>
+          <a:xfrm>
+            <a:off x="685800" y="1957009"/>
+            <a:ext cx="4252500" cy="1159800"/>
+          </a:xfrm>
+          <a:prstGeom prst="rect">
+            <a:avLst/>
+          </a:prstGeom>
+        </p:spPr>
+        <p:txBody>
+          <a:bodyPr spcFirstLastPara="1" wrap="square" lIns="91425" tIns="91425" rIns="91425" bIns="91425" anchor="b" anchorCtr="0">
+            <a:noAutofit/>
+          </a:bodyPr>
+          <a:lstStyle/>
+          <a:p>
+            <a:pPr marL="0" lvl="0" indent="0" algn="l" rtl="0">
+              <a:spcBef>
+                <a:spcPts val="0"/>
+              </a:spcBef>
+              <a:spcAft>
+                <a:spcPts val="0"/>
+              </a:spcAft>
+              <a:buNone/>
+            </a:pPr>
+            <a:r>
+              <a:rPr lang="en" dirty="0" smtClean="0">
+                <a:solidFill>
+                  <a:srgbClr val="E8062F"/>
+                </a:solidFill>
+              </a:rPr>
+              <a:t>2.</a:t>
+            </a:r>
+            <a:endParaRPr dirty="0" smtClean="0">
+              <a:solidFill>
+                <a:srgbClr val="E8062F"/>
+              </a:solidFill>
+            </a:endParaRPr>
+          </a:p>
+          <a:p>
+            <a:pPr marL="0" lvl="0" indent="0" algn="l" rtl="0">
+              <a:spcBef>
+                <a:spcPts val="0"/>
+              </a:spcBef>
+              <a:spcAft>
+                <a:spcPts val="0"/>
+              </a:spcAft>
+              <a:buNone/>
+            </a:pPr>
+            <a:r>
+              <a:rPr lang="en" dirty="0" smtClean="0"/>
+              <a:t>Builder</a:t>
+            </a:r>
+            <a:endParaRPr dirty="0"/>
+          </a:p>
+        </p:txBody>
+      </p:sp>
+    </p:spTree>
+    <p:extLst>
+      <p:ext uri="{BB962C8B-B14F-4D97-AF65-F5344CB8AC3E}">
+        <p14:creationId xmlns:p14="http://schemas.microsoft.com/office/powerpoint/2010/main" val="843926036"/>
+      </p:ext>
+    </p:extLst>
+  </p:cSld>
+  <p:clrMapOvr>
+    <a:masterClrMapping/>
+  </p:clrMapOvr>
+  <mc:AlternateContent xmlns:mc="http://schemas.openxmlformats.org/markup-compatibility/2006" xmlns:p15="http://schemas.microsoft.com/office/powerpoint/2012/main">
+    <mc:Choice Requires="p15">
+      <p:transition xmlns:p14="http://schemas.microsoft.com/office/powerpoint/2010/main" spd="slow" p14:dur="2000">
+        <p15:prstTrans prst="prestige"/>
+      </p:transition>
+    </mc:Choice>
+    <mc:Fallback xmlns="">
+      <p:transition spd="slow">
+        <p:fade/>
+      </p:transition>
+    </mc:Fallback>
+  </mc:AlternateContent>
+  <p:timing>
+    <p:tnLst>
+      <p:par>
+        <p:cTn id="1" dur="indefinite" restart="never" nodeType="tmRoot"/>
+      </p:par>
+    </p:tnLst>
+  </p:timing>
+</p:sld>
+</file>
+
+<file path=ppt/slides/slide29.xml><?xml version="1.0" encoding="utf-8"?>
+<p:sld xmlns:a="http://schemas.openxmlformats.org/drawingml/2006/main" xmlns:r="http://schemas.openxmlformats.org/officeDocument/2006/relationships" xmlns:p="http://schemas.openxmlformats.org/presentationml/2006/main">
+  <p:cSld>
+    <p:spTree>
+      <p:nvGrpSpPr>
+        <p:cNvPr id="1" name=""/>
+        <p:cNvGrpSpPr/>
+        <p:nvPr/>
+      </p:nvGrpSpPr>
+      <p:grpSpPr>
+        <a:xfrm>
+          <a:off x="0" y="0"/>
+          <a:ext cx="0" cy="0"/>
+          <a:chOff x="0" y="0"/>
+          <a:chExt cx="0" cy="0"/>
+        </a:xfrm>
+      </p:grpSpPr>
+      <p:sp>
+        <p:nvSpPr>
+          <p:cNvPr id="3" name="Content Placeholder 2"/>
+          <p:cNvSpPr>
+            <a:spLocks noGrp="1"/>
+          </p:cNvSpPr>
+          <p:nvPr>
+            <p:ph idx="4294967295"/>
+          </p:nvPr>
+        </p:nvSpPr>
+        <p:spPr>
+          <a:xfrm>
+            <a:off x="186731" y="1350943"/>
+            <a:ext cx="5949664" cy="2236788"/>
+          </a:xfrm>
+        </p:spPr>
+        <p:txBody>
+          <a:bodyPr/>
+          <a:lstStyle/>
+          <a:p>
+            <a:pPr>
+              <a:buFont typeface="Arial" panose="020B0604020202020204" pitchFamily="34" charset="0"/>
+              <a:buChar char="•"/>
+            </a:pPr>
+            <a:r>
+              <a:rPr lang="en-US" sz="2000" dirty="0" smtClean="0"/>
+              <a:t>What is this pattern?</a:t>
+            </a:r>
+          </a:p>
+          <a:p>
+            <a:pPr>
+              <a:buFont typeface="Arial" panose="020B0604020202020204" pitchFamily="34" charset="0"/>
+              <a:buChar char="•"/>
+            </a:pPr>
+            <a:r>
+              <a:rPr lang="en-US" sz="2000" dirty="0" smtClean="0"/>
+              <a:t>When we need to use this pattern?</a:t>
+            </a:r>
+          </a:p>
+          <a:p>
+            <a:pPr>
+              <a:buFont typeface="Arial" panose="020B0604020202020204" pitchFamily="34" charset="0"/>
+              <a:buChar char="•"/>
+            </a:pPr>
+            <a:r>
+              <a:rPr lang="en-US" sz="2000" dirty="0" smtClean="0"/>
+              <a:t>How It works?</a:t>
+            </a:r>
+            <a:endParaRPr lang="en-US" sz="2000" dirty="0" smtClean="0"/>
+          </a:p>
+        </p:txBody>
+      </p:sp>
+      <p:sp>
+        <p:nvSpPr>
+          <p:cNvPr id="2" name="Title 1"/>
+          <p:cNvSpPr>
+            <a:spLocks noGrp="1"/>
+          </p:cNvSpPr>
+          <p:nvPr>
+            <p:ph type="title" idx="4294967295"/>
+          </p:nvPr>
+        </p:nvSpPr>
+        <p:spPr>
+          <a:xfrm>
+            <a:off x="186731" y="318138"/>
+            <a:ext cx="5826814" cy="668338"/>
+          </a:xfrm>
+        </p:spPr>
+        <p:txBody>
+          <a:bodyPr/>
+          <a:lstStyle/>
+          <a:p>
+            <a:r>
+              <a:rPr lang="en-US" dirty="0" smtClean="0">
+                <a:solidFill>
+                  <a:srgbClr val="FFC800"/>
+                </a:solidFill>
+              </a:rPr>
+              <a:t>Builder Design pattern</a:t>
+            </a:r>
+            <a:endParaRPr lang="en-US" dirty="0">
+              <a:solidFill>
+                <a:srgbClr val="FFC800"/>
+              </a:solidFill>
+            </a:endParaRPr>
+          </a:p>
+        </p:txBody>
+      </p:sp>
+      <p:sp>
+        <p:nvSpPr>
+          <p:cNvPr id="4" name="TextBox 3"/>
+          <p:cNvSpPr txBox="1"/>
+          <p:nvPr/>
+        </p:nvSpPr>
+        <p:spPr>
+          <a:xfrm>
+            <a:off x="4462819" y="1628774"/>
+            <a:ext cx="3766781" cy="253916"/>
+          </a:xfrm>
+          <a:prstGeom prst="rect">
+            <a:avLst/>
+          </a:prstGeom>
+          <a:noFill/>
+        </p:spPr>
+        <p:txBody>
+          <a:bodyPr wrap="square" rtlCol="0">
+            <a:spAutoFit/>
+          </a:bodyPr>
+          <a:lstStyle/>
+          <a:p>
+            <a:endParaRPr lang="en-US" sz="1050" dirty="0"/>
+          </a:p>
+        </p:txBody>
+      </p:sp>
+      <p:pic>
+        <p:nvPicPr>
+          <p:cNvPr id="5" name="Picture 4"/>
+          <p:cNvPicPr>
+            <a:picLocks noChangeAspect="1"/>
+          </p:cNvPicPr>
+          <p:nvPr/>
+        </p:nvPicPr>
+        <p:blipFill>
+          <a:blip r:embed="rId2">
+            <a:extLst>
+              <a:ext uri="{28A0092B-C50C-407E-A947-70E740481C1C}">
+                <a14:useLocalDpi xmlns:a14="http://schemas.microsoft.com/office/drawing/2010/main" val="0"/>
+              </a:ext>
+            </a:extLst>
+          </a:blip>
+          <a:stretch>
+            <a:fillRect/>
+          </a:stretch>
+        </p:blipFill>
+        <p:spPr>
+          <a:xfrm>
+            <a:off x="3162085" y="2343385"/>
+            <a:ext cx="3184124" cy="2800115"/>
+          </a:xfrm>
+          <a:prstGeom prst="rect">
+            <a:avLst/>
+          </a:prstGeom>
+        </p:spPr>
+      </p:pic>
+    </p:spTree>
+    <p:extLst>
+      <p:ext uri="{BB962C8B-B14F-4D97-AF65-F5344CB8AC3E}">
+        <p14:creationId xmlns:p14="http://schemas.microsoft.com/office/powerpoint/2010/main" val="3656335138"/>
+      </p:ext>
+    </p:extLst>
+  </p:cSld>
+  <p:clrMapOvr>
+    <a:masterClrMapping/>
+  </p:clrMapOvr>
+  <p:transition spd="slow">
+    <p:wipe/>
+  </p:transition>
+  <p:timing>
+    <p:tnLst>
+      <p:par>
+        <p:cTn id="1" dur="indefinite" restart="never" nodeType="tmRoot">
+          <p:childTnLst>
+            <p:seq concurrent="1" nextAc="seek">
+              <p:cTn id="2" dur="indefinite" nodeType="mainSeq">
+                <p:childTnLst>
+                  <p:par>
+                    <p:cTn id="3" fill="hold">
+                      <p:stCondLst>
+                        <p:cond delay="indefinite"/>
+                      </p:stCondLst>
+                      <p:childTnLst>
+                        <p:par>
+                          <p:cTn id="4" fill="hold">
+                            <p:stCondLst>
+                              <p:cond delay="0"/>
+                            </p:stCondLst>
+                            <p:childTnLst>
+                              <p:par>
+                                <p:cTn id="5" presetID="10" presetClass="entr" presetSubtype="0" fill="hold" nodeType="clickEffect">
+                                  <p:stCondLst>
+                                    <p:cond delay="0"/>
+                                  </p:stCondLst>
+                                  <p:iterate type="lt">
+                                    <p:tmPct val="0"/>
+                                  </p:iterate>
+                                  <p:childTnLst>
+                                    <p:set>
+                                      <p:cBhvr>
+                                        <p:cTn id="6" dur="1" fill="hold">
+                                          <p:stCondLst>
+                                            <p:cond delay="0"/>
+                                          </p:stCondLst>
+                                        </p:cTn>
+                                        <p:tgtEl>
+                                          <p:spTgt spid="3">
+                                            <p:txEl>
+                                              <p:pRg st="0" end="0"/>
+                                            </p:txEl>
+                                          </p:spTgt>
+                                        </p:tgtEl>
+                                        <p:attrNameLst>
+                                          <p:attrName>style.visibility</p:attrName>
+                                        </p:attrNameLst>
+                                      </p:cBhvr>
+                                      <p:to>
+                                        <p:strVal val="visible"/>
+                                      </p:to>
+                                    </p:set>
+                                    <p:animEffect transition="in" filter="fade">
+                                      <p:cBhvr>
+                                        <p:cTn id="7" dur="500"/>
+                                        <p:tgtEl>
+                                          <p:spTgt spid="3">
+                                            <p:txEl>
+                                              <p:pRg st="0" end="0"/>
+                                            </p:txEl>
+                                          </p:spTgt>
+                                        </p:tgtEl>
+                                      </p:cBhvr>
+                                    </p:animEffect>
+                                  </p:childTnLst>
+                                </p:cTn>
+                              </p:par>
+                              <p:par>
+                                <p:cTn id="8" presetID="10" presetClass="entr" presetSubtype="0" fill="hold" nodeType="withEffect">
+                                  <p:stCondLst>
+                                    <p:cond delay="0"/>
+                                  </p:stCondLst>
+                                  <p:iterate type="lt">
+                                    <p:tmPct val="0"/>
+                                  </p:iterate>
+                                  <p:childTnLst>
+                                    <p:set>
+                                      <p:cBhvr>
+                                        <p:cTn id="9" dur="1" fill="hold">
+                                          <p:stCondLst>
+                                            <p:cond delay="0"/>
+                                          </p:stCondLst>
+                                        </p:cTn>
+                                        <p:tgtEl>
+                                          <p:spTgt spid="3">
+                                            <p:txEl>
+                                              <p:pRg st="1" end="1"/>
+                                            </p:txEl>
+                                          </p:spTgt>
+                                        </p:tgtEl>
+                                        <p:attrNameLst>
+                                          <p:attrName>style.visibility</p:attrName>
+                                        </p:attrNameLst>
+                                      </p:cBhvr>
+                                      <p:to>
+                                        <p:strVal val="visible"/>
+                                      </p:to>
+                                    </p:set>
+                                    <p:animEffect transition="in" filter="fade">
+                                      <p:cBhvr>
+                                        <p:cTn id="10" dur="500"/>
+                                        <p:tgtEl>
+                                          <p:spTgt spid="3">
+                                            <p:txEl>
+                                              <p:pRg st="1" end="1"/>
+                                            </p:txEl>
+                                          </p:spTgt>
+                                        </p:tgtEl>
+                                      </p:cBhvr>
+                                    </p:animEffect>
+                                  </p:childTnLst>
+                                </p:cTn>
+                              </p:par>
+                              <p:par>
+                                <p:cTn id="11" presetID="10" presetClass="entr" presetSubtype="0" fill="hold" nodeType="withEffect">
+                                  <p:stCondLst>
+                                    <p:cond delay="0"/>
+                                  </p:stCondLst>
+                                  <p:iterate type="lt">
+                                    <p:tmPct val="0"/>
+                                  </p:iterate>
+                                  <p:childTnLst>
+                                    <p:set>
+                                      <p:cBhvr>
+                                        <p:cTn id="12" dur="1" fill="hold">
+                                          <p:stCondLst>
+                                            <p:cond delay="0"/>
+                                          </p:stCondLst>
+                                        </p:cTn>
+                                        <p:tgtEl>
+                                          <p:spTgt spid="3">
+                                            <p:txEl>
+                                              <p:pRg st="2" end="2"/>
+                                            </p:txEl>
+                                          </p:spTgt>
+                                        </p:tgtEl>
+                                        <p:attrNameLst>
+                                          <p:attrName>style.visibility</p:attrName>
+                                        </p:attrNameLst>
+                                      </p:cBhvr>
+                                      <p:to>
+                                        <p:strVal val="visible"/>
+                                      </p:to>
+                                    </p:set>
+                                    <p:animEffect transition="in" filter="fade">
+                                      <p:cBhvr>
+                                        <p:cTn id="13" dur="500"/>
+                                        <p:tgtEl>
+                                          <p:spTgt spid="3">
+                                            <p:txEl>
+                                              <p:pRg st="2" end="2"/>
+                                            </p:txEl>
+                                          </p:spTgt>
+                                        </p:tgtEl>
+                                      </p:cBhvr>
+                                    </p:animEffect>
+                                  </p:childTnLst>
+                                </p:cTn>
+                              </p:par>
+                            </p:childTnLst>
+                          </p:cTn>
+                        </p:par>
+                      </p:childTnLst>
+                    </p:cTn>
+                  </p:par>
+                  <p:par>
+                    <p:cTn id="14" fill="hold">
+                      <p:stCondLst>
+                        <p:cond delay="indefinite"/>
+                      </p:stCondLst>
+                      <p:childTnLst>
+                        <p:par>
+                          <p:cTn id="15" fill="hold">
+                            <p:stCondLst>
+                              <p:cond delay="0"/>
+                            </p:stCondLst>
+                            <p:childTnLst>
+                              <p:par>
+                                <p:cTn id="16" presetID="16" presetClass="emph" presetSubtype="0" fill="hold" nodeType="clickEffect">
+                                  <p:stCondLst>
+                                    <p:cond delay="0"/>
+                                  </p:stCondLst>
+                                  <p:iterate type="lt">
+                                    <p:tmPct val="4000"/>
+                                  </p:iterate>
+                                  <p:childTnLst>
+                                    <p:set>
+                                      <p:cBhvr override="childStyle">
+                                        <p:cTn id="17" dur="500" fill="hold"/>
+                                        <p:tgtEl>
+                                          <p:spTgt spid="3">
+                                            <p:txEl>
+                                              <p:pRg st="0" end="0"/>
+                                            </p:txEl>
+                                          </p:spTgt>
+                                        </p:tgtEl>
+                                        <p:attrNameLst>
+                                          <p:attrName>style.color</p:attrName>
+                                        </p:attrNameLst>
+                                      </p:cBhvr>
+                                      <p:to>
+                                        <p:clrVal>
+                                          <a:srgbClr val="F20000"/>
+                                        </p:clrVal>
+                                      </p:to>
+                                    </p:set>
+                                    <p:set>
+                                      <p:cBhvr>
+                                        <p:cTn id="18" dur="500" fill="hold"/>
+                                        <p:tgtEl>
+                                          <p:spTgt spid="3">
+                                            <p:txEl>
+                                              <p:pRg st="0" end="0"/>
+                                            </p:txEl>
+                                          </p:spTgt>
+                                        </p:tgtEl>
+                                        <p:attrNameLst>
+                                          <p:attrName>fillcolor</p:attrName>
+                                        </p:attrNameLst>
+                                      </p:cBhvr>
+                                      <p:to>
+                                        <p:clrVal>
+                                          <a:srgbClr val="F20000"/>
+                                        </p:clrVal>
+                                      </p:to>
+                                    </p:set>
+                                    <p:set>
+                                      <p:cBhvr>
+                                        <p:cTn id="19" dur="500" fill="hold"/>
+                                        <p:tgtEl>
+                                          <p:spTgt spid="3">
+                                            <p:txEl>
+                                              <p:pRg st="0" end="0"/>
+                                            </p:txEl>
+                                          </p:spTgt>
+                                        </p:tgtEl>
+                                        <p:attrNameLst>
+                                          <p:attrName>fill.type</p:attrName>
+                                        </p:attrNameLst>
+                                      </p:cBhvr>
+                                      <p:to>
+                                        <p:strVal val="solid"/>
+                                      </p:to>
+                                    </p:set>
+                                  </p:childTnLst>
+                                </p:cTn>
+                              </p:par>
+                            </p:childTnLst>
+                          </p:cTn>
+                        </p:par>
+                      </p:childTnLst>
+                    </p:cTn>
+                  </p:par>
+                  <p:par>
+                    <p:cTn id="20" fill="hold">
+                      <p:stCondLst>
+                        <p:cond delay="indefinite"/>
+                      </p:stCondLst>
+                      <p:childTnLst>
+                        <p:par>
+                          <p:cTn id="21" fill="hold">
+                            <p:stCondLst>
+                              <p:cond delay="0"/>
+                            </p:stCondLst>
+                            <p:childTnLst>
+                              <p:par>
+                                <p:cTn id="22" presetID="10" presetClass="entr" presetSubtype="0" fill="hold" nodeType="clickEffect">
+                                  <p:stCondLst>
+                                    <p:cond delay="0"/>
+                                  </p:stCondLst>
+                                  <p:childTnLst>
+                                    <p:set>
+                                      <p:cBhvr>
+                                        <p:cTn id="23" dur="1" fill="hold">
+                                          <p:stCondLst>
+                                            <p:cond delay="0"/>
+                                          </p:stCondLst>
+                                        </p:cTn>
+                                        <p:tgtEl>
+                                          <p:spTgt spid="5"/>
+                                        </p:tgtEl>
+                                        <p:attrNameLst>
+                                          <p:attrName>style.visibility</p:attrName>
+                                        </p:attrNameLst>
+                                      </p:cBhvr>
+                                      <p:to>
+                                        <p:strVal val="visible"/>
+                                      </p:to>
+                                    </p:set>
+                                    <p:animEffect transition="in" filter="fade">
+                                      <p:cBhvr>
+                                        <p:cTn id="24" dur="500"/>
+                                        <p:tgtEl>
+                                          <p:spTgt spid="5"/>
+                                        </p:tgtEl>
+                                      </p:cBhvr>
+                                    </p:animEffect>
+                                  </p:childTnLst>
+                                </p:cTn>
+                              </p:par>
+                            </p:childTnLst>
+                          </p:cTn>
+                        </p:par>
+                      </p:childTnLst>
+                    </p:cTn>
+                  </p:par>
+                  <p:par>
+                    <p:cTn id="25" fill="hold">
+                      <p:stCondLst>
+                        <p:cond delay="indefinite"/>
+                      </p:stCondLst>
+                      <p:childTnLst>
+                        <p:par>
+                          <p:cTn id="26" fill="hold">
+                            <p:stCondLst>
+                              <p:cond delay="0"/>
+                            </p:stCondLst>
+                            <p:childTnLst>
+                              <p:par>
+                                <p:cTn id="27" presetID="16" presetClass="emph" presetSubtype="0" fill="hold" nodeType="clickEffect">
+                                  <p:stCondLst>
+                                    <p:cond delay="0"/>
+                                  </p:stCondLst>
+                                  <p:iterate type="lt">
+                                    <p:tmPct val="4000"/>
+                                  </p:iterate>
+                                  <p:childTnLst>
+                                    <p:set>
+                                      <p:cBhvr override="childStyle">
+                                        <p:cTn id="28" dur="500" fill="hold"/>
+                                        <p:tgtEl>
+                                          <p:spTgt spid="3">
+                                            <p:txEl>
+                                              <p:pRg st="1" end="1"/>
+                                            </p:txEl>
+                                          </p:spTgt>
+                                        </p:tgtEl>
+                                        <p:attrNameLst>
+                                          <p:attrName>style.color</p:attrName>
+                                        </p:attrNameLst>
+                                      </p:cBhvr>
+                                      <p:to>
+                                        <p:clrVal>
+                                          <a:srgbClr val="F20000"/>
+                                        </p:clrVal>
+                                      </p:to>
+                                    </p:set>
+                                    <p:set>
+                                      <p:cBhvr>
+                                        <p:cTn id="29" dur="500" fill="hold"/>
+                                        <p:tgtEl>
+                                          <p:spTgt spid="3">
+                                            <p:txEl>
+                                              <p:pRg st="1" end="1"/>
+                                            </p:txEl>
+                                          </p:spTgt>
+                                        </p:tgtEl>
+                                        <p:attrNameLst>
+                                          <p:attrName>fillcolor</p:attrName>
+                                        </p:attrNameLst>
+                                      </p:cBhvr>
+                                      <p:to>
+                                        <p:clrVal>
+                                          <a:srgbClr val="F20000"/>
+                                        </p:clrVal>
+                                      </p:to>
+                                    </p:set>
+                                    <p:set>
+                                      <p:cBhvr>
+                                        <p:cTn id="30" dur="500" fill="hold"/>
+                                        <p:tgtEl>
+                                          <p:spTgt spid="3">
+                                            <p:txEl>
+                                              <p:pRg st="1" end="1"/>
+                                            </p:txEl>
+                                          </p:spTgt>
+                                        </p:tgtEl>
+                                        <p:attrNameLst>
+                                          <p:attrName>fill.type</p:attrName>
+                                        </p:attrNameLst>
+                                      </p:cBhvr>
+                                      <p:to>
+                                        <p:strVal val="solid"/>
+                                      </p:to>
+                                    </p:set>
+                                  </p:childTnLst>
+                                </p:cTn>
+                              </p:par>
+                              <p:par>
+                                <p:cTn id="31" presetID="16" presetClass="emph" presetSubtype="0" fill="hold" nodeType="withEffect">
+                                  <p:stCondLst>
+                                    <p:cond delay="0"/>
+                                  </p:stCondLst>
+                                  <p:iterate type="lt">
+                                    <p:tmPct val="4000"/>
+                                  </p:iterate>
+                                  <p:childTnLst>
+                                    <p:set>
+                                      <p:cBhvr override="childStyle">
+                                        <p:cTn id="32" dur="500" fill="hold"/>
+                                        <p:tgtEl>
+                                          <p:spTgt spid="3">
+                                            <p:txEl>
+                                              <p:pRg st="0" end="0"/>
+                                            </p:txEl>
+                                          </p:spTgt>
+                                        </p:tgtEl>
+                                        <p:attrNameLst>
+                                          <p:attrName>style.color</p:attrName>
+                                        </p:attrNameLst>
+                                      </p:cBhvr>
+                                      <p:to>
+                                        <p:clrVal>
+                                          <a:schemeClr val="tx1"/>
+                                        </p:clrVal>
+                                      </p:to>
+                                    </p:set>
+                                    <p:set>
+                                      <p:cBhvr>
+                                        <p:cTn id="33" dur="500" fill="hold"/>
+                                        <p:tgtEl>
+                                          <p:spTgt spid="3">
+                                            <p:txEl>
+                                              <p:pRg st="0" end="0"/>
+                                            </p:txEl>
+                                          </p:spTgt>
+                                        </p:tgtEl>
+                                        <p:attrNameLst>
+                                          <p:attrName>fillcolor</p:attrName>
+                                        </p:attrNameLst>
+                                      </p:cBhvr>
+                                      <p:to>
+                                        <p:clrVal>
+                                          <a:schemeClr val="tx1"/>
+                                        </p:clrVal>
+                                      </p:to>
+                                    </p:set>
+                                    <p:set>
+                                      <p:cBhvr>
+                                        <p:cTn id="34" dur="500" fill="hold"/>
+                                        <p:tgtEl>
+                                          <p:spTgt spid="3">
+                                            <p:txEl>
+                                              <p:pRg st="0" end="0"/>
+                                            </p:txEl>
+                                          </p:spTgt>
+                                        </p:tgtEl>
+                                        <p:attrNameLst>
+                                          <p:attrName>fill.type</p:attrName>
+                                        </p:attrNameLst>
+                                      </p:cBhvr>
+                                      <p:to>
+                                        <p:strVal val="solid"/>
+                                      </p:to>
+                                    </p:set>
+                                  </p:childTnLst>
+                                </p:cTn>
+                              </p:par>
+                            </p:childTnLst>
+                          </p:cTn>
+                        </p:par>
+                      </p:childTnLst>
+                    </p:cTn>
+                  </p:par>
+                  <p:par>
+                    <p:cTn id="35" fill="hold">
+                      <p:stCondLst>
+                        <p:cond delay="indefinite"/>
+                      </p:stCondLst>
+                      <p:childTnLst>
+                        <p:par>
+                          <p:cTn id="36" fill="hold">
+                            <p:stCondLst>
+                              <p:cond delay="0"/>
+                            </p:stCondLst>
+                            <p:childTnLst>
+                              <p:par>
+                                <p:cTn id="37" presetID="16" presetClass="emph" presetSubtype="0" fill="hold" nodeType="clickEffect">
+                                  <p:stCondLst>
+                                    <p:cond delay="0"/>
+                                  </p:stCondLst>
+                                  <p:iterate type="lt">
+                                    <p:tmPct val="4000"/>
+                                  </p:iterate>
+                                  <p:childTnLst>
+                                    <p:set>
+                                      <p:cBhvr override="childStyle">
+                                        <p:cTn id="38" dur="500" fill="hold"/>
+                                        <p:tgtEl>
+                                          <p:spTgt spid="3">
+                                            <p:txEl>
+                                              <p:pRg st="2" end="2"/>
+                                            </p:txEl>
+                                          </p:spTgt>
+                                        </p:tgtEl>
+                                        <p:attrNameLst>
+                                          <p:attrName>style.color</p:attrName>
+                                        </p:attrNameLst>
+                                      </p:cBhvr>
+                                      <p:to>
+                                        <p:clrVal>
+                                          <a:srgbClr val="F20000"/>
+                                        </p:clrVal>
+                                      </p:to>
+                                    </p:set>
+                                    <p:set>
+                                      <p:cBhvr>
+                                        <p:cTn id="39" dur="500" fill="hold"/>
+                                        <p:tgtEl>
+                                          <p:spTgt spid="3">
+                                            <p:txEl>
+                                              <p:pRg st="2" end="2"/>
+                                            </p:txEl>
+                                          </p:spTgt>
+                                        </p:tgtEl>
+                                        <p:attrNameLst>
+                                          <p:attrName>fillcolor</p:attrName>
+                                        </p:attrNameLst>
+                                      </p:cBhvr>
+                                      <p:to>
+                                        <p:clrVal>
+                                          <a:srgbClr val="F20000"/>
+                                        </p:clrVal>
+                                      </p:to>
+                                    </p:set>
+                                    <p:set>
+                                      <p:cBhvr>
+                                        <p:cTn id="40" dur="500" fill="hold"/>
+                                        <p:tgtEl>
+                                          <p:spTgt spid="3">
+                                            <p:txEl>
+                                              <p:pRg st="2" end="2"/>
+                                            </p:txEl>
+                                          </p:spTgt>
+                                        </p:tgtEl>
+                                        <p:attrNameLst>
+                                          <p:attrName>fill.type</p:attrName>
+                                        </p:attrNameLst>
+                                      </p:cBhvr>
+                                      <p:to>
+                                        <p:strVal val="solid"/>
+                                      </p:to>
+                                    </p:set>
+                                  </p:childTnLst>
+                                </p:cTn>
+                              </p:par>
+                              <p:par>
+                                <p:cTn id="41" presetID="16" presetClass="emph" presetSubtype="0" fill="hold" nodeType="withEffect">
+                                  <p:stCondLst>
+                                    <p:cond delay="0"/>
+                                  </p:stCondLst>
+                                  <p:iterate type="lt">
+                                    <p:tmPct val="4000"/>
+                                  </p:iterate>
+                                  <p:childTnLst>
+                                    <p:set>
+                                      <p:cBhvr override="childStyle">
+                                        <p:cTn id="42" dur="500" fill="hold"/>
+                                        <p:tgtEl>
+                                          <p:spTgt spid="3">
+                                            <p:txEl>
+                                              <p:pRg st="1" end="1"/>
+                                            </p:txEl>
+                                          </p:spTgt>
+                                        </p:tgtEl>
+                                        <p:attrNameLst>
+                                          <p:attrName>style.color</p:attrName>
+                                        </p:attrNameLst>
+                                      </p:cBhvr>
+                                      <p:to>
+                                        <p:clrVal>
+                                          <a:schemeClr val="tx1"/>
+                                        </p:clrVal>
+                                      </p:to>
+                                    </p:set>
+                                    <p:set>
+                                      <p:cBhvr>
+                                        <p:cTn id="43" dur="500" fill="hold"/>
+                                        <p:tgtEl>
+                                          <p:spTgt spid="3">
+                                            <p:txEl>
+                                              <p:pRg st="1" end="1"/>
+                                            </p:txEl>
+                                          </p:spTgt>
+                                        </p:tgtEl>
+                                        <p:attrNameLst>
+                                          <p:attrName>fillcolor</p:attrName>
+                                        </p:attrNameLst>
+                                      </p:cBhvr>
+                                      <p:to>
+                                        <p:clrVal>
+                                          <a:schemeClr val="tx1"/>
+                                        </p:clrVal>
+                                      </p:to>
+                                    </p:set>
+                                    <p:set>
+                                      <p:cBhvr>
+                                        <p:cTn id="44" dur="500" fill="hold"/>
+                                        <p:tgtEl>
+                                          <p:spTgt spid="3">
+                                            <p:txEl>
+                                              <p:pRg st="1" end="1"/>
+                                            </p:txEl>
+                                          </p:spTgt>
+                                        </p:tgtEl>
+                                        <p:attrNameLst>
+                                          <p:attrName>fill.type</p:attrName>
+                                        </p:attrNameLst>
+                                      </p:cBhvr>
+                                      <p:to>
+                                        <p:strVal val="solid"/>
+                                      </p:to>
+                                    </p:set>
+                                  </p:childTnLst>
+                                </p:cTn>
+                              </p:par>
+                            </p:childTnLst>
+                          </p:cTn>
+                        </p:par>
+                      </p:childTnLst>
+                    </p:cTn>
+                  </p:par>
+                </p:childTnLst>
+              </p:cTn>
+              <p:prevCondLst>
+                <p:cond evt="onPrev" delay="0">
+                  <p:tgtEl>
+                    <p:sldTgt/>
+                  </p:tgtEl>
+                </p:cond>
+              </p:prevCondLst>
+              <p:nextCondLst>
+                <p:cond evt="onNext" delay="0">
+                  <p:tgtEl>
+                    <p:sldTgt/>
+                  </p:tgtEl>
+                </p:cond>
+              </p:nextCondLst>
+            </p:seq>
+          </p:childTnLst>
+        </p:cTn>
       </p:par>
     </p:tnLst>
   </p:timing>
@@ -38519,6 +39795,1329 @@
 </p:sld>
 </file>
 
+<file path=ppt/slides/slide30.xml><?xml version="1.0" encoding="utf-8"?>
+<p:sld xmlns:a="http://schemas.openxmlformats.org/drawingml/2006/main" xmlns:r="http://schemas.openxmlformats.org/officeDocument/2006/relationships" xmlns:p="http://schemas.openxmlformats.org/presentationml/2006/main">
+  <p:cSld>
+    <p:spTree>
+      <p:nvGrpSpPr>
+        <p:cNvPr id="1" name="Shape 648"/>
+        <p:cNvGrpSpPr/>
+        <p:nvPr/>
+      </p:nvGrpSpPr>
+      <p:grpSpPr>
+        <a:xfrm>
+          <a:off x="0" y="0"/>
+          <a:ext cx="0" cy="0"/>
+          <a:chOff x="0" y="0"/>
+          <a:chExt cx="0" cy="0"/>
+        </a:xfrm>
+      </p:grpSpPr>
+      <p:sp>
+        <p:nvSpPr>
+          <p:cNvPr id="649" name="Google Shape;649;p17"/>
+          <p:cNvSpPr txBox="1">
+            <a:spLocks noGrp="1"/>
+          </p:cNvSpPr>
+          <p:nvPr>
+            <p:ph type="ctrTitle"/>
+          </p:nvPr>
+        </p:nvSpPr>
+        <p:spPr>
+          <a:xfrm>
+            <a:off x="685800" y="1957009"/>
+            <a:ext cx="4252500" cy="1159800"/>
+          </a:xfrm>
+          <a:prstGeom prst="rect">
+            <a:avLst/>
+          </a:prstGeom>
+        </p:spPr>
+        <p:txBody>
+          <a:bodyPr spcFirstLastPara="1" wrap="square" lIns="91425" tIns="91425" rIns="91425" bIns="91425" anchor="b" anchorCtr="0">
+            <a:noAutofit/>
+          </a:bodyPr>
+          <a:lstStyle/>
+          <a:p>
+            <a:pPr marL="0" lvl="0" indent="0" algn="l" rtl="0">
+              <a:spcBef>
+                <a:spcPts val="0"/>
+              </a:spcBef>
+              <a:spcAft>
+                <a:spcPts val="0"/>
+              </a:spcAft>
+              <a:buNone/>
+            </a:pPr>
+            <a:r>
+              <a:rPr lang="en" dirty="0">
+                <a:solidFill>
+                  <a:srgbClr val="E8062F"/>
+                </a:solidFill>
+              </a:rPr>
+              <a:t>3</a:t>
+            </a:r>
+            <a:r>
+              <a:rPr lang="en" dirty="0" smtClean="0">
+                <a:solidFill>
+                  <a:srgbClr val="E8062F"/>
+                </a:solidFill>
+              </a:rPr>
+              <a:t>.</a:t>
+            </a:r>
+            <a:endParaRPr dirty="0" smtClean="0">
+              <a:solidFill>
+                <a:srgbClr val="E8062F"/>
+              </a:solidFill>
+            </a:endParaRPr>
+          </a:p>
+          <a:p>
+            <a:pPr marL="0" lvl="0" indent="0" algn="l" rtl="0">
+              <a:spcBef>
+                <a:spcPts val="0"/>
+              </a:spcBef>
+              <a:spcAft>
+                <a:spcPts val="0"/>
+              </a:spcAft>
+              <a:buNone/>
+            </a:pPr>
+            <a:r>
+              <a:rPr lang="en" dirty="0" smtClean="0"/>
+              <a:t>Adapter</a:t>
+            </a:r>
+            <a:endParaRPr dirty="0"/>
+          </a:p>
+        </p:txBody>
+      </p:sp>
+    </p:spTree>
+    <p:extLst>
+      <p:ext uri="{BB962C8B-B14F-4D97-AF65-F5344CB8AC3E}">
+        <p14:creationId xmlns:p14="http://schemas.microsoft.com/office/powerpoint/2010/main" val="2953462340"/>
+      </p:ext>
+    </p:extLst>
+  </p:cSld>
+  <p:clrMapOvr>
+    <a:masterClrMapping/>
+  </p:clrMapOvr>
+  <mc:AlternateContent xmlns:mc="http://schemas.openxmlformats.org/markup-compatibility/2006" xmlns:p15="http://schemas.microsoft.com/office/powerpoint/2012/main">
+    <mc:Choice Requires="p15">
+      <p:transition xmlns:p14="http://schemas.microsoft.com/office/powerpoint/2010/main" spd="slow" p14:dur="2000">
+        <p15:prstTrans prst="prestige"/>
+      </p:transition>
+    </mc:Choice>
+    <mc:Fallback xmlns="">
+      <p:transition spd="slow">
+        <p:fade/>
+      </p:transition>
+    </mc:Fallback>
+  </mc:AlternateContent>
+  <p:timing>
+    <p:tnLst>
+      <p:par>
+        <p:cTn id="1" dur="indefinite" restart="never" nodeType="tmRoot"/>
+      </p:par>
+    </p:tnLst>
+  </p:timing>
+</p:sld>
+</file>
+
+<file path=ppt/slides/slide31.xml><?xml version="1.0" encoding="utf-8"?>
+<p:sld xmlns:a="http://schemas.openxmlformats.org/drawingml/2006/main" xmlns:r="http://schemas.openxmlformats.org/officeDocument/2006/relationships" xmlns:p="http://schemas.openxmlformats.org/presentationml/2006/main">
+  <p:cSld>
+    <p:spTree>
+      <p:nvGrpSpPr>
+        <p:cNvPr id="1" name=""/>
+        <p:cNvGrpSpPr/>
+        <p:nvPr/>
+      </p:nvGrpSpPr>
+      <p:grpSpPr>
+        <a:xfrm>
+          <a:off x="0" y="0"/>
+          <a:ext cx="0" cy="0"/>
+          <a:chOff x="0" y="0"/>
+          <a:chExt cx="0" cy="0"/>
+        </a:xfrm>
+      </p:grpSpPr>
+      <p:sp>
+        <p:nvSpPr>
+          <p:cNvPr id="2" name="Title 1"/>
+          <p:cNvSpPr>
+            <a:spLocks noGrp="1"/>
+          </p:cNvSpPr>
+          <p:nvPr>
+            <p:ph type="title" idx="4294967295"/>
+          </p:nvPr>
+        </p:nvSpPr>
+        <p:spPr>
+          <a:xfrm>
+            <a:off x="286439" y="371016"/>
+            <a:ext cx="5299113" cy="668338"/>
+          </a:xfrm>
+        </p:spPr>
+        <p:txBody>
+          <a:bodyPr/>
+          <a:lstStyle/>
+          <a:p>
+            <a:r>
+              <a:rPr lang="en-US" dirty="0" smtClean="0">
+                <a:solidFill>
+                  <a:srgbClr val="FFC000"/>
+                </a:solidFill>
+              </a:rPr>
+              <a:t>Adapter	</a:t>
+            </a:r>
+            <a:endParaRPr lang="en-US" dirty="0">
+              <a:solidFill>
+                <a:srgbClr val="FFC000"/>
+              </a:solidFill>
+            </a:endParaRPr>
+          </a:p>
+        </p:txBody>
+      </p:sp>
+      <p:sp>
+        <p:nvSpPr>
+          <p:cNvPr id="3" name="Content Placeholder 2"/>
+          <p:cNvSpPr>
+            <a:spLocks noGrp="1"/>
+          </p:cNvSpPr>
+          <p:nvPr>
+            <p:ph idx="4294967295"/>
+          </p:nvPr>
+        </p:nvSpPr>
+        <p:spPr>
+          <a:xfrm>
+            <a:off x="286439" y="1228251"/>
+            <a:ext cx="6533002" cy="2625725"/>
+          </a:xfrm>
+        </p:spPr>
+        <p:txBody>
+          <a:bodyPr/>
+          <a:lstStyle/>
+          <a:p>
+            <a:pPr>
+              <a:buFont typeface="Arial" panose="020B0604020202020204" pitchFamily="34" charset="0"/>
+              <a:buChar char="•"/>
+            </a:pPr>
+            <a:r>
+              <a:rPr lang="en-US" sz="2000" dirty="0" smtClean="0"/>
+              <a:t>What is the problem?</a:t>
+            </a:r>
+          </a:p>
+          <a:p>
+            <a:pPr>
+              <a:buFont typeface="Arial" panose="020B0604020202020204" pitchFamily="34" charset="0"/>
+              <a:buChar char="•"/>
+            </a:pPr>
+            <a:r>
+              <a:rPr lang="en-US" sz="2000" dirty="0" smtClean="0"/>
+              <a:t>How adapter going to solve this problem?</a:t>
+            </a:r>
+          </a:p>
+          <a:p>
+            <a:pPr>
+              <a:buFont typeface="Arial" panose="020B0604020202020204" pitchFamily="34" charset="0"/>
+              <a:buChar char="•"/>
+            </a:pPr>
+            <a:r>
+              <a:rPr lang="en-US" sz="2000" dirty="0" smtClean="0"/>
+              <a:t>Example code</a:t>
+            </a:r>
+          </a:p>
+          <a:p>
+            <a:pPr>
+              <a:buFont typeface="Arial" panose="020B0604020202020204" pitchFamily="34" charset="0"/>
+              <a:buChar char="•"/>
+            </a:pPr>
+            <a:endParaRPr lang="en-US" sz="2000" dirty="0"/>
+          </a:p>
+        </p:txBody>
+      </p:sp>
+      <p:pic>
+        <p:nvPicPr>
+          <p:cNvPr id="6" name="Picture 5"/>
+          <p:cNvPicPr>
+            <a:picLocks noChangeAspect="1"/>
+          </p:cNvPicPr>
+          <p:nvPr/>
+        </p:nvPicPr>
+        <p:blipFill>
+          <a:blip r:embed="rId2" cstate="print">
+            <a:extLst>
+              <a:ext uri="{BEBA8EAE-BF5A-486C-A8C5-ECC9F3942E4B}">
+                <a14:imgProps xmlns:a14="http://schemas.microsoft.com/office/drawing/2010/main">
+                  <a14:imgLayer r:embed="rId3">
+                    <a14:imgEffect>
+                      <a14:backgroundRemoval t="9485" b="89973" l="6233" r="94580"/>
+                    </a14:imgEffect>
+                  </a14:imgLayer>
+                </a14:imgProps>
+              </a:ext>
+              <a:ext uri="{28A0092B-C50C-407E-A947-70E740481C1C}">
+                <a14:useLocalDpi xmlns:a14="http://schemas.microsoft.com/office/drawing/2010/main" val="0"/>
+              </a:ext>
+            </a:extLst>
+          </a:blip>
+          <a:stretch>
+            <a:fillRect/>
+          </a:stretch>
+        </p:blipFill>
+        <p:spPr>
+          <a:xfrm>
+            <a:off x="3728828" y="2357831"/>
+            <a:ext cx="2366323" cy="2366323"/>
+          </a:xfrm>
+          <a:prstGeom prst="rect">
+            <a:avLst/>
+          </a:prstGeom>
+        </p:spPr>
+      </p:pic>
+      <p:pic>
+        <p:nvPicPr>
+          <p:cNvPr id="7" name="Picture 6"/>
+          <p:cNvPicPr>
+            <a:picLocks noChangeAspect="1"/>
+          </p:cNvPicPr>
+          <p:nvPr/>
+        </p:nvPicPr>
+        <p:blipFill>
+          <a:blip r:embed="rId4">
+            <a:extLst>
+              <a:ext uri="{BEBA8EAE-BF5A-486C-A8C5-ECC9F3942E4B}">
+                <a14:imgProps xmlns:a14="http://schemas.microsoft.com/office/drawing/2010/main">
+                  <a14:imgLayer r:embed="rId5">
+                    <a14:imgEffect>
+                      <a14:backgroundRemoval t="10000" b="90000" l="4000" r="94500"/>
+                    </a14:imgEffect>
+                  </a14:imgLayer>
+                </a14:imgProps>
+              </a:ext>
+              <a:ext uri="{28A0092B-C50C-407E-A947-70E740481C1C}">
+                <a14:useLocalDpi xmlns:a14="http://schemas.microsoft.com/office/drawing/2010/main" val="0"/>
+              </a:ext>
+            </a:extLst>
+          </a:blip>
+          <a:stretch>
+            <a:fillRect/>
+          </a:stretch>
+        </p:blipFill>
+        <p:spPr>
+          <a:xfrm>
+            <a:off x="4139149" y="2357831"/>
+            <a:ext cx="2032663" cy="1524497"/>
+          </a:xfrm>
+          <a:prstGeom prst="rect">
+            <a:avLst/>
+          </a:prstGeom>
+        </p:spPr>
+      </p:pic>
+      <p:pic>
+        <p:nvPicPr>
+          <p:cNvPr id="8" name="Picture 7"/>
+          <p:cNvPicPr>
+            <a:picLocks noChangeAspect="1"/>
+          </p:cNvPicPr>
+          <p:nvPr/>
+        </p:nvPicPr>
+        <p:blipFill>
+          <a:blip r:embed="rId6">
+            <a:extLst>
+              <a:ext uri="{BEBA8EAE-BF5A-486C-A8C5-ECC9F3942E4B}">
+                <a14:imgProps xmlns:a14="http://schemas.microsoft.com/office/drawing/2010/main">
+                  <a14:imgLayer r:embed="rId7">
+                    <a14:imgEffect>
+                      <a14:backgroundRemoval t="10000" b="90000" l="4667" r="96667"/>
+                    </a14:imgEffect>
+                  </a14:imgLayer>
+                </a14:imgProps>
+              </a:ext>
+              <a:ext uri="{28A0092B-C50C-407E-A947-70E740481C1C}">
+                <a14:useLocalDpi xmlns:a14="http://schemas.microsoft.com/office/drawing/2010/main" val="0"/>
+              </a:ext>
+            </a:extLst>
+          </a:blip>
+          <a:stretch>
+            <a:fillRect/>
+          </a:stretch>
+        </p:blipFill>
+        <p:spPr>
+          <a:xfrm>
+            <a:off x="4139150" y="3264679"/>
+            <a:ext cx="2077124" cy="2077124"/>
+          </a:xfrm>
+          <a:prstGeom prst="rect">
+            <a:avLst/>
+          </a:prstGeom>
+        </p:spPr>
+      </p:pic>
+    </p:spTree>
+    <p:extLst>
+      <p:ext uri="{BB962C8B-B14F-4D97-AF65-F5344CB8AC3E}">
+        <p14:creationId xmlns:p14="http://schemas.microsoft.com/office/powerpoint/2010/main" val="944156713"/>
+      </p:ext>
+    </p:extLst>
+  </p:cSld>
+  <p:clrMapOvr>
+    <a:masterClrMapping/>
+  </p:clrMapOvr>
+  <p:transition spd="slow">
+    <p:wipe/>
+  </p:transition>
+  <p:timing>
+    <p:tnLst>
+      <p:par>
+        <p:cTn id="1" dur="indefinite" restart="never" nodeType="tmRoot">
+          <p:childTnLst>
+            <p:seq concurrent="1" nextAc="seek">
+              <p:cTn id="2" dur="indefinite" nodeType="mainSeq">
+                <p:childTnLst>
+                  <p:par>
+                    <p:cTn id="3" fill="hold">
+                      <p:stCondLst>
+                        <p:cond delay="indefinite"/>
+                      </p:stCondLst>
+                      <p:childTnLst>
+                        <p:par>
+                          <p:cTn id="4" fill="hold">
+                            <p:stCondLst>
+                              <p:cond delay="0"/>
+                            </p:stCondLst>
+                            <p:childTnLst>
+                              <p:par>
+                                <p:cTn id="5" presetID="10" presetClass="entr" presetSubtype="0" fill="hold" nodeType="clickEffect">
+                                  <p:stCondLst>
+                                    <p:cond delay="0"/>
+                                  </p:stCondLst>
+                                  <p:childTnLst>
+                                    <p:set>
+                                      <p:cBhvr>
+                                        <p:cTn id="6" dur="1" fill="hold">
+                                          <p:stCondLst>
+                                            <p:cond delay="0"/>
+                                          </p:stCondLst>
+                                        </p:cTn>
+                                        <p:tgtEl>
+                                          <p:spTgt spid="3">
+                                            <p:txEl>
+                                              <p:pRg st="0" end="0"/>
+                                            </p:txEl>
+                                          </p:spTgt>
+                                        </p:tgtEl>
+                                        <p:attrNameLst>
+                                          <p:attrName>style.visibility</p:attrName>
+                                        </p:attrNameLst>
+                                      </p:cBhvr>
+                                      <p:to>
+                                        <p:strVal val="visible"/>
+                                      </p:to>
+                                    </p:set>
+                                    <p:animEffect transition="in" filter="fade">
+                                      <p:cBhvr>
+                                        <p:cTn id="7" dur="500"/>
+                                        <p:tgtEl>
+                                          <p:spTgt spid="3">
+                                            <p:txEl>
+                                              <p:pRg st="0" end="0"/>
+                                            </p:txEl>
+                                          </p:spTgt>
+                                        </p:tgtEl>
+                                      </p:cBhvr>
+                                    </p:animEffect>
+                                  </p:childTnLst>
+                                </p:cTn>
+                              </p:par>
+                            </p:childTnLst>
+                          </p:cTn>
+                        </p:par>
+                      </p:childTnLst>
+                    </p:cTn>
+                  </p:par>
+                  <p:par>
+                    <p:cTn id="8" fill="hold">
+                      <p:stCondLst>
+                        <p:cond delay="indefinite"/>
+                      </p:stCondLst>
+                      <p:childTnLst>
+                        <p:par>
+                          <p:cTn id="9" fill="hold">
+                            <p:stCondLst>
+                              <p:cond delay="0"/>
+                            </p:stCondLst>
+                            <p:childTnLst>
+                              <p:par>
+                                <p:cTn id="10" presetID="10" presetClass="entr" presetSubtype="0" fill="hold" nodeType="clickEffect">
+                                  <p:stCondLst>
+                                    <p:cond delay="0"/>
+                                  </p:stCondLst>
+                                  <p:childTnLst>
+                                    <p:set>
+                                      <p:cBhvr>
+                                        <p:cTn id="11" dur="1" fill="hold">
+                                          <p:stCondLst>
+                                            <p:cond delay="0"/>
+                                          </p:stCondLst>
+                                        </p:cTn>
+                                        <p:tgtEl>
+                                          <p:spTgt spid="8"/>
+                                        </p:tgtEl>
+                                        <p:attrNameLst>
+                                          <p:attrName>style.visibility</p:attrName>
+                                        </p:attrNameLst>
+                                      </p:cBhvr>
+                                      <p:to>
+                                        <p:strVal val="visible"/>
+                                      </p:to>
+                                    </p:set>
+                                    <p:animEffect transition="in" filter="fade">
+                                      <p:cBhvr>
+                                        <p:cTn id="12" dur="500"/>
+                                        <p:tgtEl>
+                                          <p:spTgt spid="8"/>
+                                        </p:tgtEl>
+                                      </p:cBhvr>
+                                    </p:animEffect>
+                                  </p:childTnLst>
+                                </p:cTn>
+                              </p:par>
+                              <p:par>
+                                <p:cTn id="13" presetID="10" presetClass="entr" presetSubtype="0" fill="hold" nodeType="withEffect">
+                                  <p:stCondLst>
+                                    <p:cond delay="0"/>
+                                  </p:stCondLst>
+                                  <p:childTnLst>
+                                    <p:set>
+                                      <p:cBhvr>
+                                        <p:cTn id="14" dur="1" fill="hold">
+                                          <p:stCondLst>
+                                            <p:cond delay="0"/>
+                                          </p:stCondLst>
+                                        </p:cTn>
+                                        <p:tgtEl>
+                                          <p:spTgt spid="7"/>
+                                        </p:tgtEl>
+                                        <p:attrNameLst>
+                                          <p:attrName>style.visibility</p:attrName>
+                                        </p:attrNameLst>
+                                      </p:cBhvr>
+                                      <p:to>
+                                        <p:strVal val="visible"/>
+                                      </p:to>
+                                    </p:set>
+                                    <p:animEffect transition="in" filter="fade">
+                                      <p:cBhvr>
+                                        <p:cTn id="15" dur="500"/>
+                                        <p:tgtEl>
+                                          <p:spTgt spid="7"/>
+                                        </p:tgtEl>
+                                      </p:cBhvr>
+                                    </p:animEffect>
+                                  </p:childTnLst>
+                                </p:cTn>
+                              </p:par>
+                            </p:childTnLst>
+                          </p:cTn>
+                        </p:par>
+                      </p:childTnLst>
+                    </p:cTn>
+                  </p:par>
+                  <p:par>
+                    <p:cTn id="16" fill="hold">
+                      <p:stCondLst>
+                        <p:cond delay="indefinite"/>
+                      </p:stCondLst>
+                      <p:childTnLst>
+                        <p:par>
+                          <p:cTn id="17" fill="hold">
+                            <p:stCondLst>
+                              <p:cond delay="0"/>
+                            </p:stCondLst>
+                            <p:childTnLst>
+                              <p:par>
+                                <p:cTn id="18" presetID="10" presetClass="entr" presetSubtype="0" fill="hold" nodeType="clickEffect">
+                                  <p:stCondLst>
+                                    <p:cond delay="0"/>
+                                  </p:stCondLst>
+                                  <p:childTnLst>
+                                    <p:set>
+                                      <p:cBhvr>
+                                        <p:cTn id="19" dur="1" fill="hold">
+                                          <p:stCondLst>
+                                            <p:cond delay="0"/>
+                                          </p:stCondLst>
+                                        </p:cTn>
+                                        <p:tgtEl>
+                                          <p:spTgt spid="3">
+                                            <p:txEl>
+                                              <p:pRg st="1" end="1"/>
+                                            </p:txEl>
+                                          </p:spTgt>
+                                        </p:tgtEl>
+                                        <p:attrNameLst>
+                                          <p:attrName>style.visibility</p:attrName>
+                                        </p:attrNameLst>
+                                      </p:cBhvr>
+                                      <p:to>
+                                        <p:strVal val="visible"/>
+                                      </p:to>
+                                    </p:set>
+                                    <p:animEffect transition="in" filter="fade">
+                                      <p:cBhvr>
+                                        <p:cTn id="20" dur="500"/>
+                                        <p:tgtEl>
+                                          <p:spTgt spid="3">
+                                            <p:txEl>
+                                              <p:pRg st="1" end="1"/>
+                                            </p:txEl>
+                                          </p:spTgt>
+                                        </p:tgtEl>
+                                      </p:cBhvr>
+                                    </p:animEffect>
+                                  </p:childTnLst>
+                                </p:cTn>
+                              </p:par>
+                            </p:childTnLst>
+                          </p:cTn>
+                        </p:par>
+                      </p:childTnLst>
+                    </p:cTn>
+                  </p:par>
+                  <p:par>
+                    <p:cTn id="21" fill="hold">
+                      <p:stCondLst>
+                        <p:cond delay="indefinite"/>
+                      </p:stCondLst>
+                      <p:childTnLst>
+                        <p:par>
+                          <p:cTn id="22" fill="hold">
+                            <p:stCondLst>
+                              <p:cond delay="0"/>
+                            </p:stCondLst>
+                            <p:childTnLst>
+                              <p:par>
+                                <p:cTn id="23" presetID="10" presetClass="exit" presetSubtype="0" fill="hold" nodeType="clickEffect">
+                                  <p:stCondLst>
+                                    <p:cond delay="0"/>
+                                  </p:stCondLst>
+                                  <p:childTnLst>
+                                    <p:animEffect transition="out" filter="fade">
+                                      <p:cBhvr>
+                                        <p:cTn id="24" dur="500"/>
+                                        <p:tgtEl>
+                                          <p:spTgt spid="8"/>
+                                        </p:tgtEl>
+                                      </p:cBhvr>
+                                    </p:animEffect>
+                                    <p:set>
+                                      <p:cBhvr>
+                                        <p:cTn id="25" dur="1" fill="hold">
+                                          <p:stCondLst>
+                                            <p:cond delay="499"/>
+                                          </p:stCondLst>
+                                        </p:cTn>
+                                        <p:tgtEl>
+                                          <p:spTgt spid="8"/>
+                                        </p:tgtEl>
+                                        <p:attrNameLst>
+                                          <p:attrName>style.visibility</p:attrName>
+                                        </p:attrNameLst>
+                                      </p:cBhvr>
+                                      <p:to>
+                                        <p:strVal val="hidden"/>
+                                      </p:to>
+                                    </p:set>
+                                  </p:childTnLst>
+                                </p:cTn>
+                              </p:par>
+                              <p:par>
+                                <p:cTn id="26" presetID="10" presetClass="exit" presetSubtype="0" fill="hold" nodeType="withEffect">
+                                  <p:stCondLst>
+                                    <p:cond delay="0"/>
+                                  </p:stCondLst>
+                                  <p:childTnLst>
+                                    <p:animEffect transition="out" filter="fade">
+                                      <p:cBhvr>
+                                        <p:cTn id="27" dur="500"/>
+                                        <p:tgtEl>
+                                          <p:spTgt spid="7"/>
+                                        </p:tgtEl>
+                                      </p:cBhvr>
+                                    </p:animEffect>
+                                    <p:set>
+                                      <p:cBhvr>
+                                        <p:cTn id="28" dur="1" fill="hold">
+                                          <p:stCondLst>
+                                            <p:cond delay="499"/>
+                                          </p:stCondLst>
+                                        </p:cTn>
+                                        <p:tgtEl>
+                                          <p:spTgt spid="7"/>
+                                        </p:tgtEl>
+                                        <p:attrNameLst>
+                                          <p:attrName>style.visibility</p:attrName>
+                                        </p:attrNameLst>
+                                      </p:cBhvr>
+                                      <p:to>
+                                        <p:strVal val="hidden"/>
+                                      </p:to>
+                                    </p:set>
+                                  </p:childTnLst>
+                                </p:cTn>
+                              </p:par>
+                              <p:par>
+                                <p:cTn id="29" presetID="10" presetClass="entr" presetSubtype="0" fill="hold" nodeType="withEffect">
+                                  <p:stCondLst>
+                                    <p:cond delay="0"/>
+                                  </p:stCondLst>
+                                  <p:childTnLst>
+                                    <p:set>
+                                      <p:cBhvr>
+                                        <p:cTn id="30" dur="1" fill="hold">
+                                          <p:stCondLst>
+                                            <p:cond delay="0"/>
+                                          </p:stCondLst>
+                                        </p:cTn>
+                                        <p:tgtEl>
+                                          <p:spTgt spid="6"/>
+                                        </p:tgtEl>
+                                        <p:attrNameLst>
+                                          <p:attrName>style.visibility</p:attrName>
+                                        </p:attrNameLst>
+                                      </p:cBhvr>
+                                      <p:to>
+                                        <p:strVal val="visible"/>
+                                      </p:to>
+                                    </p:set>
+                                    <p:animEffect transition="in" filter="fade">
+                                      <p:cBhvr>
+                                        <p:cTn id="31" dur="500"/>
+                                        <p:tgtEl>
+                                          <p:spTgt spid="6"/>
+                                        </p:tgtEl>
+                                      </p:cBhvr>
+                                    </p:animEffect>
+                                  </p:childTnLst>
+                                </p:cTn>
+                              </p:par>
+                            </p:childTnLst>
+                          </p:cTn>
+                        </p:par>
+                      </p:childTnLst>
+                    </p:cTn>
+                  </p:par>
+                  <p:par>
+                    <p:cTn id="32" fill="hold">
+                      <p:stCondLst>
+                        <p:cond delay="indefinite"/>
+                      </p:stCondLst>
+                      <p:childTnLst>
+                        <p:par>
+                          <p:cTn id="33" fill="hold">
+                            <p:stCondLst>
+                              <p:cond delay="0"/>
+                            </p:stCondLst>
+                            <p:childTnLst>
+                              <p:par>
+                                <p:cTn id="34" presetID="10" presetClass="entr" presetSubtype="0" fill="hold" nodeType="clickEffect">
+                                  <p:stCondLst>
+                                    <p:cond delay="0"/>
+                                  </p:stCondLst>
+                                  <p:childTnLst>
+                                    <p:set>
+                                      <p:cBhvr>
+                                        <p:cTn id="35" dur="1" fill="hold">
+                                          <p:stCondLst>
+                                            <p:cond delay="0"/>
+                                          </p:stCondLst>
+                                        </p:cTn>
+                                        <p:tgtEl>
+                                          <p:spTgt spid="3">
+                                            <p:txEl>
+                                              <p:pRg st="2" end="2"/>
+                                            </p:txEl>
+                                          </p:spTgt>
+                                        </p:tgtEl>
+                                        <p:attrNameLst>
+                                          <p:attrName>style.visibility</p:attrName>
+                                        </p:attrNameLst>
+                                      </p:cBhvr>
+                                      <p:to>
+                                        <p:strVal val="visible"/>
+                                      </p:to>
+                                    </p:set>
+                                    <p:animEffect transition="in" filter="fade">
+                                      <p:cBhvr>
+                                        <p:cTn id="36" dur="500"/>
+                                        <p:tgtEl>
+                                          <p:spTgt spid="3">
+                                            <p:txEl>
+                                              <p:pRg st="2" end="2"/>
+                                            </p:txEl>
+                                          </p:spTgt>
+                                        </p:tgtEl>
+                                      </p:cBhvr>
+                                    </p:animEffect>
+                                  </p:childTnLst>
+                                </p:cTn>
+                              </p:par>
+                            </p:childTnLst>
+                          </p:cTn>
+                        </p:par>
+                      </p:childTnLst>
+                    </p:cTn>
+                  </p:par>
+                </p:childTnLst>
+              </p:cTn>
+              <p:prevCondLst>
+                <p:cond evt="onPrev" delay="0">
+                  <p:tgtEl>
+                    <p:sldTgt/>
+                  </p:tgtEl>
+                </p:cond>
+              </p:prevCondLst>
+              <p:nextCondLst>
+                <p:cond evt="onNext" delay="0">
+                  <p:tgtEl>
+                    <p:sldTgt/>
+                  </p:tgtEl>
+                </p:cond>
+              </p:nextCondLst>
+            </p:seq>
+          </p:childTnLst>
+        </p:cTn>
+      </p:par>
+    </p:tnLst>
+  </p:timing>
+</p:sld>
+</file>
+
+<file path=ppt/slides/slide32.xml><?xml version="1.0" encoding="utf-8"?>
+<p:sld xmlns:a="http://schemas.openxmlformats.org/drawingml/2006/main" xmlns:r="http://schemas.openxmlformats.org/officeDocument/2006/relationships" xmlns:p="http://schemas.openxmlformats.org/presentationml/2006/main">
+  <p:cSld>
+    <p:spTree>
+      <p:nvGrpSpPr>
+        <p:cNvPr id="1" name="Shape 648"/>
+        <p:cNvGrpSpPr/>
+        <p:nvPr/>
+      </p:nvGrpSpPr>
+      <p:grpSpPr>
+        <a:xfrm>
+          <a:off x="0" y="0"/>
+          <a:ext cx="0" cy="0"/>
+          <a:chOff x="0" y="0"/>
+          <a:chExt cx="0" cy="0"/>
+        </a:xfrm>
+      </p:grpSpPr>
+      <p:sp>
+        <p:nvSpPr>
+          <p:cNvPr id="649" name="Google Shape;649;p17"/>
+          <p:cNvSpPr txBox="1">
+            <a:spLocks noGrp="1"/>
+          </p:cNvSpPr>
+          <p:nvPr>
+            <p:ph type="ctrTitle"/>
+          </p:nvPr>
+        </p:nvSpPr>
+        <p:spPr>
+          <a:xfrm>
+            <a:off x="685800" y="1957009"/>
+            <a:ext cx="4252500" cy="1159800"/>
+          </a:xfrm>
+          <a:prstGeom prst="rect">
+            <a:avLst/>
+          </a:prstGeom>
+        </p:spPr>
+        <p:txBody>
+          <a:bodyPr spcFirstLastPara="1" wrap="square" lIns="91425" tIns="91425" rIns="91425" bIns="91425" anchor="b" anchorCtr="0">
+            <a:noAutofit/>
+          </a:bodyPr>
+          <a:lstStyle/>
+          <a:p>
+            <a:pPr marL="0" lvl="0" indent="0" algn="l" rtl="0">
+              <a:spcBef>
+                <a:spcPts val="0"/>
+              </a:spcBef>
+              <a:spcAft>
+                <a:spcPts val="0"/>
+              </a:spcAft>
+              <a:buNone/>
+            </a:pPr>
+            <a:r>
+              <a:rPr lang="en" dirty="0" smtClean="0">
+                <a:solidFill>
+                  <a:srgbClr val="E8062F"/>
+                </a:solidFill>
+              </a:rPr>
+              <a:t>4.</a:t>
+            </a:r>
+            <a:endParaRPr dirty="0" smtClean="0">
+              <a:solidFill>
+                <a:srgbClr val="E8062F"/>
+              </a:solidFill>
+            </a:endParaRPr>
+          </a:p>
+          <a:p>
+            <a:pPr marL="0" lvl="0" indent="0" algn="l" rtl="0">
+              <a:spcBef>
+                <a:spcPts val="0"/>
+              </a:spcBef>
+              <a:spcAft>
+                <a:spcPts val="0"/>
+              </a:spcAft>
+              <a:buNone/>
+            </a:pPr>
+            <a:r>
+              <a:rPr lang="en" dirty="0" smtClean="0"/>
+              <a:t>Observer</a:t>
+            </a:r>
+            <a:endParaRPr dirty="0"/>
+          </a:p>
+        </p:txBody>
+      </p:sp>
+    </p:spTree>
+    <p:extLst>
+      <p:ext uri="{BB962C8B-B14F-4D97-AF65-F5344CB8AC3E}">
+        <p14:creationId xmlns:p14="http://schemas.microsoft.com/office/powerpoint/2010/main" val="1173157411"/>
+      </p:ext>
+    </p:extLst>
+  </p:cSld>
+  <p:clrMapOvr>
+    <a:masterClrMapping/>
+  </p:clrMapOvr>
+  <mc:AlternateContent xmlns:mc="http://schemas.openxmlformats.org/markup-compatibility/2006" xmlns:p15="http://schemas.microsoft.com/office/powerpoint/2012/main">
+    <mc:Choice Requires="p15">
+      <p:transition xmlns:p14="http://schemas.microsoft.com/office/powerpoint/2010/main" spd="slow" p14:dur="2000">
+        <p15:prstTrans prst="prestige"/>
+      </p:transition>
+    </mc:Choice>
+    <mc:Fallback xmlns="">
+      <p:transition spd="slow">
+        <p:fade/>
+      </p:transition>
+    </mc:Fallback>
+  </mc:AlternateContent>
+  <p:timing>
+    <p:tnLst>
+      <p:par>
+        <p:cTn id="1" dur="indefinite" restart="never" nodeType="tmRoot"/>
+      </p:par>
+    </p:tnLst>
+  </p:timing>
+</p:sld>
+</file>
+
+<file path=ppt/slides/slide33.xml><?xml version="1.0" encoding="utf-8"?>
+<p:sld xmlns:a="http://schemas.openxmlformats.org/drawingml/2006/main" xmlns:r="http://schemas.openxmlformats.org/officeDocument/2006/relationships" xmlns:p="http://schemas.openxmlformats.org/presentationml/2006/main">
+  <p:cSld>
+    <p:spTree>
+      <p:nvGrpSpPr>
+        <p:cNvPr id="1" name=""/>
+        <p:cNvGrpSpPr/>
+        <p:nvPr/>
+      </p:nvGrpSpPr>
+      <p:grpSpPr>
+        <a:xfrm>
+          <a:off x="0" y="0"/>
+          <a:ext cx="0" cy="0"/>
+          <a:chOff x="0" y="0"/>
+          <a:chExt cx="0" cy="0"/>
+        </a:xfrm>
+      </p:grpSpPr>
+      <p:pic>
+        <p:nvPicPr>
+          <p:cNvPr id="5" name="Picture 4"/>
+          <p:cNvPicPr>
+            <a:picLocks noChangeAspect="1"/>
+          </p:cNvPicPr>
+          <p:nvPr/>
+        </p:nvPicPr>
+        <p:blipFill>
+          <a:blip r:embed="rId2">
+            <a:extLst>
+              <a:ext uri="{28A0092B-C50C-407E-A947-70E740481C1C}">
+                <a14:useLocalDpi xmlns:a14="http://schemas.microsoft.com/office/drawing/2010/main" val="0"/>
+              </a:ext>
+            </a:extLst>
+          </a:blip>
+          <a:stretch>
+            <a:fillRect/>
+          </a:stretch>
+        </p:blipFill>
+        <p:spPr>
+          <a:xfrm>
+            <a:off x="1912291" y="2113518"/>
+            <a:ext cx="4153184" cy="2768789"/>
+          </a:xfrm>
+          <a:prstGeom prst="rect">
+            <a:avLst/>
+          </a:prstGeom>
+        </p:spPr>
+      </p:pic>
+      <p:sp>
+        <p:nvSpPr>
+          <p:cNvPr id="2" name="Title 1"/>
+          <p:cNvSpPr>
+            <a:spLocks noGrp="1"/>
+          </p:cNvSpPr>
+          <p:nvPr>
+            <p:ph type="title" idx="4294967295"/>
+          </p:nvPr>
+        </p:nvSpPr>
+        <p:spPr>
+          <a:xfrm>
+            <a:off x="253388" y="216780"/>
+            <a:ext cx="5044616" cy="668338"/>
+          </a:xfrm>
+        </p:spPr>
+        <p:txBody>
+          <a:bodyPr/>
+          <a:lstStyle/>
+          <a:p>
+            <a:r>
+              <a:rPr lang="en-US" dirty="0" smtClean="0">
+                <a:solidFill>
+                  <a:srgbClr val="FFC000"/>
+                </a:solidFill>
+              </a:rPr>
+              <a:t>Observable</a:t>
+            </a:r>
+            <a:endParaRPr lang="en-US" dirty="0">
+              <a:solidFill>
+                <a:srgbClr val="FFC000"/>
+              </a:solidFill>
+            </a:endParaRPr>
+          </a:p>
+        </p:txBody>
+      </p:sp>
+      <p:sp>
+        <p:nvSpPr>
+          <p:cNvPr id="3" name="Content Placeholder 2"/>
+          <p:cNvSpPr>
+            <a:spLocks noGrp="1"/>
+          </p:cNvSpPr>
+          <p:nvPr>
+            <p:ph idx="4294967295"/>
+          </p:nvPr>
+        </p:nvSpPr>
+        <p:spPr>
+          <a:xfrm>
+            <a:off x="253388" y="1240774"/>
+            <a:ext cx="3586854" cy="2686050"/>
+          </a:xfrm>
+        </p:spPr>
+        <p:txBody>
+          <a:bodyPr/>
+          <a:lstStyle/>
+          <a:p>
+            <a:pPr>
+              <a:buFont typeface="Arial" panose="020B0604020202020204" pitchFamily="34" charset="0"/>
+              <a:buChar char="•"/>
+            </a:pPr>
+            <a:r>
+              <a:rPr lang="en-US" dirty="0" smtClean="0"/>
+              <a:t>What is it?</a:t>
+            </a:r>
+          </a:p>
+          <a:p>
+            <a:pPr>
+              <a:buFont typeface="Arial" panose="020B0604020202020204" pitchFamily="34" charset="0"/>
+              <a:buChar char="•"/>
+            </a:pPr>
+            <a:r>
+              <a:rPr lang="en-US" dirty="0" smtClean="0"/>
+              <a:t>Why we need this?</a:t>
+            </a:r>
+          </a:p>
+          <a:p>
+            <a:pPr>
+              <a:buFont typeface="Arial" panose="020B0604020202020204" pitchFamily="34" charset="0"/>
+              <a:buChar char="•"/>
+            </a:pPr>
+            <a:r>
+              <a:rPr lang="en-US" dirty="0" smtClean="0"/>
+              <a:t>How implement it?</a:t>
+            </a:r>
+            <a:endParaRPr lang="en-US" dirty="0"/>
+          </a:p>
+        </p:txBody>
+      </p:sp>
+    </p:spTree>
+    <p:extLst>
+      <p:ext uri="{BB962C8B-B14F-4D97-AF65-F5344CB8AC3E}">
+        <p14:creationId xmlns:p14="http://schemas.microsoft.com/office/powerpoint/2010/main" val="2270204082"/>
+      </p:ext>
+    </p:extLst>
+  </p:cSld>
+  <p:clrMapOvr>
+    <a:masterClrMapping/>
+  </p:clrMapOvr>
+  <p:transition spd="slow">
+    <p:wipe/>
+  </p:transition>
+  <p:timing>
+    <p:tnLst>
+      <p:par>
+        <p:cTn id="1" dur="indefinite" restart="never" nodeType="tmRoot">
+          <p:childTnLst>
+            <p:seq concurrent="1" nextAc="seek">
+              <p:cTn id="2" dur="indefinite" nodeType="mainSeq">
+                <p:childTnLst>
+                  <p:par>
+                    <p:cTn id="3" fill="hold">
+                      <p:stCondLst>
+                        <p:cond delay="indefinite"/>
+                      </p:stCondLst>
+                      <p:childTnLst>
+                        <p:par>
+                          <p:cTn id="4" fill="hold">
+                            <p:stCondLst>
+                              <p:cond delay="0"/>
+                            </p:stCondLst>
+                            <p:childTnLst>
+                              <p:par>
+                                <p:cTn id="5" presetID="10" presetClass="entr" presetSubtype="0" fill="hold" nodeType="clickEffect">
+                                  <p:stCondLst>
+                                    <p:cond delay="0"/>
+                                  </p:stCondLst>
+                                  <p:childTnLst>
+                                    <p:set>
+                                      <p:cBhvr>
+                                        <p:cTn id="6" dur="1" fill="hold">
+                                          <p:stCondLst>
+                                            <p:cond delay="0"/>
+                                          </p:stCondLst>
+                                        </p:cTn>
+                                        <p:tgtEl>
+                                          <p:spTgt spid="3">
+                                            <p:txEl>
+                                              <p:pRg st="0" end="0"/>
+                                            </p:txEl>
+                                          </p:spTgt>
+                                        </p:tgtEl>
+                                        <p:attrNameLst>
+                                          <p:attrName>style.visibility</p:attrName>
+                                        </p:attrNameLst>
+                                      </p:cBhvr>
+                                      <p:to>
+                                        <p:strVal val="visible"/>
+                                      </p:to>
+                                    </p:set>
+                                    <p:animEffect transition="in" filter="fade">
+                                      <p:cBhvr>
+                                        <p:cTn id="7" dur="500"/>
+                                        <p:tgtEl>
+                                          <p:spTgt spid="3">
+                                            <p:txEl>
+                                              <p:pRg st="0" end="0"/>
+                                            </p:txEl>
+                                          </p:spTgt>
+                                        </p:tgtEl>
+                                      </p:cBhvr>
+                                    </p:animEffect>
+                                  </p:childTnLst>
+                                </p:cTn>
+                              </p:par>
+                            </p:childTnLst>
+                          </p:cTn>
+                        </p:par>
+                      </p:childTnLst>
+                    </p:cTn>
+                  </p:par>
+                  <p:par>
+                    <p:cTn id="8" fill="hold">
+                      <p:stCondLst>
+                        <p:cond delay="indefinite"/>
+                      </p:stCondLst>
+                      <p:childTnLst>
+                        <p:par>
+                          <p:cTn id="9" fill="hold">
+                            <p:stCondLst>
+                              <p:cond delay="0"/>
+                            </p:stCondLst>
+                            <p:childTnLst>
+                              <p:par>
+                                <p:cTn id="10" presetID="10" presetClass="entr" presetSubtype="0" fill="hold" nodeType="clickEffect">
+                                  <p:stCondLst>
+                                    <p:cond delay="0"/>
+                                  </p:stCondLst>
+                                  <p:childTnLst>
+                                    <p:set>
+                                      <p:cBhvr>
+                                        <p:cTn id="11" dur="1" fill="hold">
+                                          <p:stCondLst>
+                                            <p:cond delay="0"/>
+                                          </p:stCondLst>
+                                        </p:cTn>
+                                        <p:tgtEl>
+                                          <p:spTgt spid="5"/>
+                                        </p:tgtEl>
+                                        <p:attrNameLst>
+                                          <p:attrName>style.visibility</p:attrName>
+                                        </p:attrNameLst>
+                                      </p:cBhvr>
+                                      <p:to>
+                                        <p:strVal val="visible"/>
+                                      </p:to>
+                                    </p:set>
+                                    <p:animEffect transition="in" filter="fade">
+                                      <p:cBhvr>
+                                        <p:cTn id="12" dur="500"/>
+                                        <p:tgtEl>
+                                          <p:spTgt spid="5"/>
+                                        </p:tgtEl>
+                                      </p:cBhvr>
+                                    </p:animEffect>
+                                  </p:childTnLst>
+                                </p:cTn>
+                              </p:par>
+                            </p:childTnLst>
+                          </p:cTn>
+                        </p:par>
+                      </p:childTnLst>
+                    </p:cTn>
+                  </p:par>
+                  <p:par>
+                    <p:cTn id="13" fill="hold">
+                      <p:stCondLst>
+                        <p:cond delay="indefinite"/>
+                      </p:stCondLst>
+                      <p:childTnLst>
+                        <p:par>
+                          <p:cTn id="14" fill="hold">
+                            <p:stCondLst>
+                              <p:cond delay="0"/>
+                            </p:stCondLst>
+                            <p:childTnLst>
+                              <p:par>
+                                <p:cTn id="15" presetID="10" presetClass="entr" presetSubtype="0" fill="hold" nodeType="clickEffect">
+                                  <p:stCondLst>
+                                    <p:cond delay="0"/>
+                                  </p:stCondLst>
+                                  <p:childTnLst>
+                                    <p:set>
+                                      <p:cBhvr>
+                                        <p:cTn id="16" dur="1" fill="hold">
+                                          <p:stCondLst>
+                                            <p:cond delay="0"/>
+                                          </p:stCondLst>
+                                        </p:cTn>
+                                        <p:tgtEl>
+                                          <p:spTgt spid="3">
+                                            <p:txEl>
+                                              <p:pRg st="1" end="1"/>
+                                            </p:txEl>
+                                          </p:spTgt>
+                                        </p:tgtEl>
+                                        <p:attrNameLst>
+                                          <p:attrName>style.visibility</p:attrName>
+                                        </p:attrNameLst>
+                                      </p:cBhvr>
+                                      <p:to>
+                                        <p:strVal val="visible"/>
+                                      </p:to>
+                                    </p:set>
+                                    <p:animEffect transition="in" filter="fade">
+                                      <p:cBhvr>
+                                        <p:cTn id="17" dur="500"/>
+                                        <p:tgtEl>
+                                          <p:spTgt spid="3">
+                                            <p:txEl>
+                                              <p:pRg st="1" end="1"/>
+                                            </p:txEl>
+                                          </p:spTgt>
+                                        </p:tgtEl>
+                                      </p:cBhvr>
+                                    </p:animEffect>
+                                  </p:childTnLst>
+                                </p:cTn>
+                              </p:par>
+                            </p:childTnLst>
+                          </p:cTn>
+                        </p:par>
+                      </p:childTnLst>
+                    </p:cTn>
+                  </p:par>
+                  <p:par>
+                    <p:cTn id="18" fill="hold">
+                      <p:stCondLst>
+                        <p:cond delay="indefinite"/>
+                      </p:stCondLst>
+                      <p:childTnLst>
+                        <p:par>
+                          <p:cTn id="19" fill="hold">
+                            <p:stCondLst>
+                              <p:cond delay="0"/>
+                            </p:stCondLst>
+                            <p:childTnLst>
+                              <p:par>
+                                <p:cTn id="20" presetID="10" presetClass="entr" presetSubtype="0" fill="hold" nodeType="clickEffect">
+                                  <p:stCondLst>
+                                    <p:cond delay="0"/>
+                                  </p:stCondLst>
+                                  <p:childTnLst>
+                                    <p:set>
+                                      <p:cBhvr>
+                                        <p:cTn id="21" dur="1" fill="hold">
+                                          <p:stCondLst>
+                                            <p:cond delay="0"/>
+                                          </p:stCondLst>
+                                        </p:cTn>
+                                        <p:tgtEl>
+                                          <p:spTgt spid="3">
+                                            <p:txEl>
+                                              <p:pRg st="2" end="2"/>
+                                            </p:txEl>
+                                          </p:spTgt>
+                                        </p:tgtEl>
+                                        <p:attrNameLst>
+                                          <p:attrName>style.visibility</p:attrName>
+                                        </p:attrNameLst>
+                                      </p:cBhvr>
+                                      <p:to>
+                                        <p:strVal val="visible"/>
+                                      </p:to>
+                                    </p:set>
+                                    <p:animEffect transition="in" filter="fade">
+                                      <p:cBhvr>
+                                        <p:cTn id="22" dur="500"/>
+                                        <p:tgtEl>
+                                          <p:spTgt spid="3">
+                                            <p:txEl>
+                                              <p:pRg st="2" end="2"/>
+                                            </p:txEl>
+                                          </p:spTgt>
+                                        </p:tgtEl>
+                                      </p:cBhvr>
+                                    </p:animEffect>
+                                  </p:childTnLst>
+                                </p:cTn>
+                              </p:par>
+                            </p:childTnLst>
+                          </p:cTn>
+                        </p:par>
+                      </p:childTnLst>
+                    </p:cTn>
+                  </p:par>
+                </p:childTnLst>
+              </p:cTn>
+              <p:prevCondLst>
+                <p:cond evt="onPrev" delay="0">
+                  <p:tgtEl>
+                    <p:sldTgt/>
+                  </p:tgtEl>
+                </p:cond>
+              </p:prevCondLst>
+              <p:nextCondLst>
+                <p:cond evt="onNext" delay="0">
+                  <p:tgtEl>
+                    <p:sldTgt/>
+                  </p:tgtEl>
+                </p:cond>
+              </p:nextCondLst>
+            </p:seq>
+          </p:childTnLst>
+        </p:cTn>
+      </p:par>
+    </p:tnLst>
+  </p:timing>
+</p:sld>
+</file>
+
 <file path=ppt/slides/slide4.xml><?xml version="1.0" encoding="utf-8"?>
 <p:sld xmlns:a="http://schemas.openxmlformats.org/drawingml/2006/main" xmlns:r="http://schemas.openxmlformats.org/officeDocument/2006/relationships" xmlns:p="http://schemas.openxmlformats.org/presentationml/2006/main">
   <p:cSld>
@@ -39280,13 +41879,13 @@
   <p:clrMapOvr>
     <a:masterClrMapping/>
   </p:clrMapOvr>
-  <mc:AlternateContent xmlns:mc="http://schemas.openxmlformats.org/markup-compatibility/2006">
-    <mc:Choice xmlns:p14="http://schemas.microsoft.com/office/powerpoint/2010/main" Requires="p14">
+  <mc:AlternateContent xmlns:mc="http://schemas.openxmlformats.org/markup-compatibility/2006" xmlns:p14="http://schemas.microsoft.com/office/powerpoint/2010/main">
+    <mc:Choice Requires="p14">
       <p:transition spd="slow" p14:dur="1500">
         <p14:window dir="vert"/>
       </p:transition>
     </mc:Choice>
-    <mc:Fallback>
+    <mc:Fallback xmlns="">
       <p:transition spd="slow">
         <p:fade/>
       </p:transition>
@@ -40730,13 +43329,13 @@
   <p:clrMapOvr>
     <a:masterClrMapping/>
   </p:clrMapOvr>
-  <mc:AlternateContent xmlns:mc="http://schemas.openxmlformats.org/markup-compatibility/2006">
-    <mc:Choice xmlns:p15="http://schemas.microsoft.com/office/powerpoint/2012/main" Requires="p15">
+  <mc:AlternateContent xmlns:mc="http://schemas.openxmlformats.org/markup-compatibility/2006" xmlns:p15="http://schemas.microsoft.com/office/powerpoint/2012/main">
+    <mc:Choice Requires="p15">
       <p:transition xmlns:p14="http://schemas.microsoft.com/office/powerpoint/2010/main" spd="slow" p14:dur="2000">
         <p15:prstTrans prst="curtains"/>
       </p:transition>
     </mc:Choice>
-    <mc:Fallback>
+    <mc:Fallback xmlns="">
       <p:transition spd="slow">
         <p:fade/>
       </p:transition>
@@ -41257,13 +43856,13 @@
   <p:clrMapOvr>
     <a:masterClrMapping/>
   </p:clrMapOvr>
-  <mc:AlternateContent xmlns:mc="http://schemas.openxmlformats.org/markup-compatibility/2006">
-    <mc:Choice xmlns:p15="http://schemas.microsoft.com/office/powerpoint/2012/main" Requires="p15">
+  <mc:AlternateContent xmlns:mc="http://schemas.openxmlformats.org/markup-compatibility/2006" xmlns:p15="http://schemas.microsoft.com/office/powerpoint/2012/main">
+    <mc:Choice Requires="p15">
       <p:transition xmlns:p14="http://schemas.microsoft.com/office/powerpoint/2010/main" spd="slow" p14:dur="2000">
         <p15:prstTrans prst="drape"/>
       </p:transition>
     </mc:Choice>
-    <mc:Fallback>
+    <mc:Fallback xmlns="">
       <p:transition spd="slow">
         <p:fade/>
       </p:transition>
@@ -41495,13 +44094,13 @@
   <p:clrMapOvr>
     <a:masterClrMapping/>
   </p:clrMapOvr>
-  <mc:AlternateContent xmlns:mc="http://schemas.openxmlformats.org/markup-compatibility/2006">
-    <mc:Choice xmlns:p14="http://schemas.microsoft.com/office/powerpoint/2010/main" Requires="p14">
+  <mc:AlternateContent xmlns:mc="http://schemas.openxmlformats.org/markup-compatibility/2006" xmlns:p14="http://schemas.microsoft.com/office/powerpoint/2010/main">
+    <mc:Choice Requires="p14">
       <p:transition spd="slow" p14:dur="2500">
         <p:checker/>
       </p:transition>
     </mc:Choice>
-    <mc:Fallback>
+    <mc:Fallback xmlns="">
       <p:transition spd="slow">
         <p:checker/>
       </p:transition>
@@ -41827,15 +44426,7 @@
                   <a:srgbClr val="FFA400"/>
                 </a:solidFill>
               </a:rPr>
-              <a:t>Types of Patterns: </a:t>
-            </a:r>
-            <a:r>
-              <a:rPr lang="en" sz="2800" dirty="0" smtClean="0">
-                <a:solidFill>
-                  <a:srgbClr val="FFA400"/>
-                </a:solidFill>
-              </a:rPr>
-              <a:t>Based on purpose</a:t>
+              <a:t>Types of Patterns: Based on purpose</a:t>
             </a:r>
             <a:endParaRPr sz="2800" dirty="0">
               <a:solidFill>
@@ -42469,15 +45060,7 @@
                   <a:srgbClr val="FFA400"/>
                 </a:solidFill>
               </a:rPr>
-              <a:t>Types of Patterns: </a:t>
-            </a:r>
-            <a:r>
-              <a:rPr lang="en" sz="2800" dirty="0" smtClean="0">
-                <a:solidFill>
-                  <a:srgbClr val="FFA400"/>
-                </a:solidFill>
-              </a:rPr>
-              <a:t>Based on scope</a:t>
+              <a:t>Types of Patterns: Based on scope</a:t>
             </a:r>
             <a:endParaRPr sz="2800" dirty="0">
               <a:solidFill>

</xml_diff>